<commit_message>
Update the presentation document
</commit_message>
<xml_diff>
--- a/docs/Team2_Project_Phase1_Presentation.pptx
+++ b/docs/Team2_Project_Phase1_Presentation.pptx
@@ -5,20 +5,22 @@
     <p:sldMasterId id="2147483648" r:id="rId1"/>
   </p:sldMasterIdLst>
   <p:notesMasterIdLst>
-    <p:notesMasterId r:id="rId13"/>
+    <p:notesMasterId r:id="rId15"/>
   </p:notesMasterIdLst>
   <p:sldIdLst>
     <p:sldId id="260" r:id="rId2"/>
-    <p:sldId id="286" r:id="rId3"/>
-    <p:sldId id="287" r:id="rId4"/>
-    <p:sldId id="284" r:id="rId5"/>
-    <p:sldId id="285" r:id="rId6"/>
-    <p:sldId id="283" r:id="rId7"/>
-    <p:sldId id="279" r:id="rId8"/>
-    <p:sldId id="282" r:id="rId9"/>
-    <p:sldId id="289" r:id="rId10"/>
-    <p:sldId id="288" r:id="rId11"/>
-    <p:sldId id="290" r:id="rId12"/>
+    <p:sldId id="291" r:id="rId3"/>
+    <p:sldId id="286" r:id="rId4"/>
+    <p:sldId id="287" r:id="rId5"/>
+    <p:sldId id="284" r:id="rId6"/>
+    <p:sldId id="285" r:id="rId7"/>
+    <p:sldId id="283" r:id="rId8"/>
+    <p:sldId id="279" r:id="rId9"/>
+    <p:sldId id="282" r:id="rId10"/>
+    <p:sldId id="289" r:id="rId11"/>
+    <p:sldId id="288" r:id="rId12"/>
+    <p:sldId id="290" r:id="rId13"/>
+    <p:sldId id="293" r:id="rId14"/>
   </p:sldIdLst>
   <p:sldSz cx="12192000" cy="6858000"/>
   <p:notesSz cx="6858000" cy="9144000"/>
@@ -4073,6 +4075,358 @@
       </p:grpSpPr>
       <p:sp>
         <p:nvSpPr>
+          <p:cNvPr id="5" name="제목 1"/>
+          <p:cNvSpPr txBox="1">
+            <a:spLocks/>
+          </p:cNvSpPr>
+          <p:nvPr/>
+        </p:nvSpPr>
+        <p:spPr>
+          <a:xfrm>
+            <a:off x="544052" y="312306"/>
+            <a:ext cx="10515600" cy="829340"/>
+          </a:xfrm>
+          <a:prstGeom prst="rect">
+            <a:avLst/>
+          </a:prstGeom>
+        </p:spPr>
+        <p:txBody>
+          <a:bodyPr>
+            <a:normAutofit/>
+          </a:bodyPr>
+          <a:lstStyle>
+            <a:lvl1pPr algn="l" defTabSz="914400" rtl="0" eaLnBrk="1" latinLnBrk="1" hangingPunct="1">
+              <a:lnSpc>
+                <a:spcPct val="90000"/>
+              </a:lnSpc>
+              <a:spcBef>
+                <a:spcPct val="0"/>
+              </a:spcBef>
+              <a:buNone/>
+              <a:defRPr sz="4400" kern="1200">
+                <a:solidFill>
+                  <a:schemeClr val="tx1"/>
+                </a:solidFill>
+                <a:latin typeface="+mj-lt"/>
+                <a:ea typeface="+mj-ea"/>
+                <a:cs typeface="+mj-cs"/>
+              </a:defRPr>
+            </a:lvl1pPr>
+          </a:lstStyle>
+          <a:p>
+            <a:r>
+              <a:rPr lang="en-US" altLang="ko-KR" sz="2000" b="1" dirty="0" smtClean="0">
+                <a:latin typeface="Verdana" panose="020B0604030504040204" pitchFamily="34" charset="0"/>
+                <a:ea typeface="Verdana" panose="020B0604030504040204" pitchFamily="34" charset="0"/>
+              </a:rPr>
+              <a:t>Learning Mode</a:t>
+            </a:r>
+            <a:endParaRPr lang="ko-KR" altLang="en-US" sz="2000" b="1" dirty="0">
+              <a:latin typeface="Verdana" panose="020B0604030504040204" pitchFamily="34" charset="0"/>
+            </a:endParaRPr>
+          </a:p>
+        </p:txBody>
+      </p:sp>
+      <p:pic>
+        <p:nvPicPr>
+          <p:cNvPr id="12" name="그림 11"/>
+          <p:cNvPicPr>
+            <a:picLocks noChangeAspect="1"/>
+          </p:cNvPicPr>
+          <p:nvPr/>
+        </p:nvPicPr>
+        <p:blipFill>
+          <a:blip r:embed="rId3"/>
+          <a:stretch>
+            <a:fillRect/>
+          </a:stretch>
+        </p:blipFill>
+        <p:spPr>
+          <a:xfrm>
+            <a:off x="198407" y="1274969"/>
+            <a:ext cx="5895975" cy="4276725"/>
+          </a:xfrm>
+          <a:prstGeom prst="rect">
+            <a:avLst/>
+          </a:prstGeom>
+        </p:spPr>
+      </p:pic>
+      <p:pic>
+        <p:nvPicPr>
+          <p:cNvPr id="13" name="그림 12"/>
+          <p:cNvPicPr>
+            <a:picLocks noChangeAspect="1"/>
+          </p:cNvPicPr>
+          <p:nvPr/>
+        </p:nvPicPr>
+        <p:blipFill>
+          <a:blip r:embed="rId4"/>
+          <a:stretch>
+            <a:fillRect/>
+          </a:stretch>
+        </p:blipFill>
+        <p:spPr>
+          <a:xfrm>
+            <a:off x="5957887" y="2273401"/>
+            <a:ext cx="6010275" cy="4362450"/>
+          </a:xfrm>
+          <a:prstGeom prst="rect">
+            <a:avLst/>
+          </a:prstGeom>
+        </p:spPr>
+      </p:pic>
+      <p:sp>
+        <p:nvSpPr>
+          <p:cNvPr id="8" name="모서리가 둥근 사각형 설명선 7"/>
+          <p:cNvSpPr/>
+          <p:nvPr/>
+        </p:nvSpPr>
+        <p:spPr>
+          <a:xfrm>
+            <a:off x="10286999" y="5248276"/>
+            <a:ext cx="1763518" cy="561975"/>
+          </a:xfrm>
+          <a:prstGeom prst="wedgeRoundRectCallout">
+            <a:avLst>
+              <a:gd name="adj1" fmla="val 26651"/>
+              <a:gd name="adj2" fmla="val -158786"/>
+              <a:gd name="adj3" fmla="val 16667"/>
+            </a:avLst>
+          </a:prstGeom>
+          <a:solidFill>
+            <a:schemeClr val="accent2">
+              <a:lumMod val="20000"/>
+              <a:lumOff val="80000"/>
+            </a:schemeClr>
+          </a:solidFill>
+          <a:ln w="9525">
+            <a:solidFill>
+              <a:schemeClr val="tx1"/>
+            </a:solidFill>
+            <a:prstDash val="solid"/>
+          </a:ln>
+        </p:spPr>
+        <p:style>
+          <a:lnRef idx="2">
+            <a:schemeClr val="accent1">
+              <a:shade val="50000"/>
+            </a:schemeClr>
+          </a:lnRef>
+          <a:fillRef idx="1">
+            <a:schemeClr val="accent1"/>
+          </a:fillRef>
+          <a:effectRef idx="0">
+            <a:schemeClr val="accent1"/>
+          </a:effectRef>
+          <a:fontRef idx="minor">
+            <a:schemeClr val="lt1"/>
+          </a:fontRef>
+        </p:style>
+        <p:txBody>
+          <a:bodyPr rtlCol="0" anchor="ctr"/>
+          <a:lstStyle/>
+          <a:p>
+            <a:pPr algn="ctr"/>
+            <a:r>
+              <a:rPr lang="en-US" altLang="ko-KR" sz="900" dirty="0" smtClean="0">
+                <a:solidFill>
+                  <a:schemeClr val="tx1"/>
+                </a:solidFill>
+                <a:latin typeface="Verdana" panose="020B0604030504040204" pitchFamily="34" charset="0"/>
+                <a:ea typeface="Verdana" panose="020B0604030504040204" pitchFamily="34" charset="0"/>
+              </a:rPr>
+              <a:t>3) Select confirm to add the image</a:t>
+            </a:r>
+            <a:endParaRPr lang="ko-KR" altLang="en-US" sz="900">
+              <a:solidFill>
+                <a:schemeClr val="tx1"/>
+              </a:solidFill>
+              <a:latin typeface="Verdana" panose="020B0604030504040204" pitchFamily="34" charset="0"/>
+            </a:endParaRPr>
+          </a:p>
+        </p:txBody>
+      </p:sp>
+      <p:sp>
+        <p:nvSpPr>
+          <p:cNvPr id="7" name="모서리가 둥근 사각형 설명선 6"/>
+          <p:cNvSpPr/>
+          <p:nvPr/>
+        </p:nvSpPr>
+        <p:spPr>
+          <a:xfrm>
+            <a:off x="5535298" y="2027470"/>
+            <a:ext cx="1762125" cy="341181"/>
+          </a:xfrm>
+          <a:prstGeom prst="wedgeRoundRectCallout">
+            <a:avLst>
+              <a:gd name="adj1" fmla="val -51087"/>
+              <a:gd name="adj2" fmla="val 203676"/>
+              <a:gd name="adj3" fmla="val 16667"/>
+            </a:avLst>
+          </a:prstGeom>
+          <a:solidFill>
+            <a:schemeClr val="accent2">
+              <a:lumMod val="20000"/>
+              <a:lumOff val="80000"/>
+            </a:schemeClr>
+          </a:solidFill>
+          <a:ln w="9525">
+            <a:solidFill>
+              <a:schemeClr val="tx1"/>
+            </a:solidFill>
+            <a:prstDash val="solid"/>
+          </a:ln>
+        </p:spPr>
+        <p:style>
+          <a:lnRef idx="2">
+            <a:schemeClr val="accent1">
+              <a:shade val="50000"/>
+            </a:schemeClr>
+          </a:lnRef>
+          <a:fillRef idx="1">
+            <a:schemeClr val="accent1"/>
+          </a:fillRef>
+          <a:effectRef idx="0">
+            <a:schemeClr val="accent1"/>
+          </a:effectRef>
+          <a:fontRef idx="minor">
+            <a:schemeClr val="lt1"/>
+          </a:fontRef>
+        </p:style>
+        <p:txBody>
+          <a:bodyPr rtlCol="0" anchor="ctr"/>
+          <a:lstStyle/>
+          <a:p>
+            <a:pPr algn="ctr"/>
+            <a:r>
+              <a:rPr lang="en-US" altLang="ko-KR" sz="900" dirty="0" smtClean="0">
+                <a:solidFill>
+                  <a:schemeClr val="tx1"/>
+                </a:solidFill>
+                <a:latin typeface="Verdana" panose="020B0604030504040204" pitchFamily="34" charset="0"/>
+                <a:ea typeface="Verdana" panose="020B0604030504040204" pitchFamily="34" charset="0"/>
+              </a:rPr>
+              <a:t>1) Select Capture</a:t>
+            </a:r>
+            <a:endParaRPr lang="ko-KR" altLang="en-US" sz="900">
+              <a:solidFill>
+                <a:schemeClr val="tx1"/>
+              </a:solidFill>
+              <a:latin typeface="Verdana" panose="020B0604030504040204" pitchFamily="34" charset="0"/>
+            </a:endParaRPr>
+          </a:p>
+        </p:txBody>
+      </p:sp>
+      <p:sp>
+        <p:nvSpPr>
+          <p:cNvPr id="9" name="모서리가 둥근 사각형 설명선 8"/>
+          <p:cNvSpPr/>
+          <p:nvPr/>
+        </p:nvSpPr>
+        <p:spPr>
+          <a:xfrm>
+            <a:off x="9965419" y="3372406"/>
+            <a:ext cx="1762125" cy="529595"/>
+          </a:xfrm>
+          <a:prstGeom prst="wedgeRoundRectCallout">
+            <a:avLst>
+              <a:gd name="adj1" fmla="val -2980"/>
+              <a:gd name="adj2" fmla="val 167704"/>
+              <a:gd name="adj3" fmla="val 16667"/>
+            </a:avLst>
+          </a:prstGeom>
+          <a:solidFill>
+            <a:schemeClr val="accent2">
+              <a:lumMod val="20000"/>
+              <a:lumOff val="80000"/>
+            </a:schemeClr>
+          </a:solidFill>
+          <a:ln w="9525">
+            <a:solidFill>
+              <a:schemeClr val="tx1"/>
+            </a:solidFill>
+            <a:prstDash val="solid"/>
+          </a:ln>
+        </p:spPr>
+        <p:style>
+          <a:lnRef idx="2">
+            <a:schemeClr val="accent1">
+              <a:shade val="50000"/>
+            </a:schemeClr>
+          </a:lnRef>
+          <a:fillRef idx="1">
+            <a:schemeClr val="accent1"/>
+          </a:fillRef>
+          <a:effectRef idx="0">
+            <a:schemeClr val="accent1"/>
+          </a:effectRef>
+          <a:fontRef idx="minor">
+            <a:schemeClr val="lt1"/>
+          </a:fontRef>
+        </p:style>
+        <p:txBody>
+          <a:bodyPr rtlCol="0" anchor="ctr"/>
+          <a:lstStyle/>
+          <a:p>
+            <a:pPr algn="ctr"/>
+            <a:r>
+              <a:rPr lang="en-US" altLang="ko-KR" sz="900" dirty="0" smtClean="0">
+                <a:solidFill>
+                  <a:schemeClr val="tx1"/>
+                </a:solidFill>
+                <a:latin typeface="Verdana" panose="020B0604030504040204" pitchFamily="34" charset="0"/>
+                <a:ea typeface="Verdana" panose="020B0604030504040204" pitchFamily="34" charset="0"/>
+              </a:rPr>
+              <a:t>2) Input the name for the captured image</a:t>
+            </a:r>
+            <a:endParaRPr lang="ko-KR" altLang="en-US" sz="900">
+              <a:solidFill>
+                <a:schemeClr val="tx1"/>
+              </a:solidFill>
+              <a:latin typeface="Verdana" panose="020B0604030504040204" pitchFamily="34" charset="0"/>
+            </a:endParaRPr>
+          </a:p>
+        </p:txBody>
+      </p:sp>
+    </p:spTree>
+    <p:extLst>
+      <p:ext uri="{BB962C8B-B14F-4D97-AF65-F5344CB8AC3E}">
+        <p14:creationId xmlns:p14="http://schemas.microsoft.com/office/powerpoint/2010/main" val="1610454920"/>
+      </p:ext>
+    </p:extLst>
+  </p:cSld>
+  <p:clrMapOvr>
+    <a:masterClrMapping/>
+  </p:clrMapOvr>
+  <p:timing>
+    <p:tnLst>
+      <p:par>
+        <p:cTn id="1" dur="indefinite" restart="never" nodeType="tmRoot"/>
+      </p:par>
+    </p:tnLst>
+  </p:timing>
+</p:sld>
+</file>
+
+<file path=ppt/slides/slide11.xml><?xml version="1.0" encoding="utf-8"?>
+<p:sld xmlns:a="http://schemas.openxmlformats.org/drawingml/2006/main" xmlns:r="http://schemas.openxmlformats.org/officeDocument/2006/relationships" xmlns:p="http://schemas.openxmlformats.org/presentationml/2006/main">
+  <p:cSld>
+    <p:spTree>
+      <p:nvGrpSpPr>
+        <p:cNvPr id="1" name="Shape 93"/>
+        <p:cNvGrpSpPr/>
+        <p:nvPr/>
+      </p:nvGrpSpPr>
+      <p:grpSpPr>
+        <a:xfrm>
+          <a:off x="0" y="0"/>
+          <a:ext cx="0" cy="0"/>
+          <a:chOff x="0" y="0"/>
+          <a:chExt cx="0" cy="0"/>
+        </a:xfrm>
+      </p:grpSpPr>
+      <p:sp>
+        <p:nvSpPr>
           <p:cNvPr id="9" name="제목 1"/>
           <p:cNvSpPr txBox="1">
             <a:spLocks/>
@@ -4240,7 +4594,7 @@
 </p:sld>
 </file>
 
-<file path=ppt/slides/slide11.xml><?xml version="1.0" encoding="utf-8"?>
+<file path=ppt/slides/slide12.xml><?xml version="1.0" encoding="utf-8"?>
 <p:sld xmlns:a="http://schemas.openxmlformats.org/drawingml/2006/main" xmlns:r="http://schemas.openxmlformats.org/officeDocument/2006/relationships" xmlns:p="http://schemas.openxmlformats.org/presentationml/2006/main">
   <p:cSld>
     <p:spTree>
@@ -4426,7 +4780,2657 @@
 </p:sld>
 </file>
 
+<file path=ppt/slides/slide13.xml><?xml version="1.0" encoding="utf-8"?>
+<p:sld xmlns:a="http://schemas.openxmlformats.org/drawingml/2006/main" xmlns:r="http://schemas.openxmlformats.org/officeDocument/2006/relationships" xmlns:p="http://schemas.openxmlformats.org/presentationml/2006/main">
+  <p:cSld>
+    <p:spTree>
+      <p:nvGrpSpPr>
+        <p:cNvPr id="1" name=""/>
+        <p:cNvGrpSpPr/>
+        <p:nvPr/>
+      </p:nvGrpSpPr>
+      <p:grpSpPr>
+        <a:xfrm>
+          <a:off x="0" y="0"/>
+          <a:ext cx="0" cy="0"/>
+          <a:chOff x="0" y="0"/>
+          <a:chExt cx="0" cy="0"/>
+        </a:xfrm>
+      </p:grpSpPr>
+      <p:sp>
+        <p:nvSpPr>
+          <p:cNvPr id="2" name="제목 1"/>
+          <p:cNvSpPr txBox="1">
+            <a:spLocks/>
+          </p:cNvSpPr>
+          <p:nvPr/>
+        </p:nvSpPr>
+        <p:spPr>
+          <a:xfrm>
+            <a:off x="544052" y="312306"/>
+            <a:ext cx="10515600" cy="829340"/>
+          </a:xfrm>
+          <a:prstGeom prst="rect">
+            <a:avLst/>
+          </a:prstGeom>
+        </p:spPr>
+        <p:txBody>
+          <a:bodyPr>
+            <a:normAutofit/>
+          </a:bodyPr>
+          <a:lstStyle>
+            <a:lvl1pPr algn="l" defTabSz="914400" rtl="0" eaLnBrk="1" latinLnBrk="1" hangingPunct="1">
+              <a:lnSpc>
+                <a:spcPct val="90000"/>
+              </a:lnSpc>
+              <a:spcBef>
+                <a:spcPct val="0"/>
+              </a:spcBef>
+              <a:buNone/>
+              <a:defRPr sz="4400" kern="1200">
+                <a:solidFill>
+                  <a:schemeClr val="tx1"/>
+                </a:solidFill>
+                <a:latin typeface="+mj-lt"/>
+                <a:ea typeface="+mj-ea"/>
+                <a:cs typeface="+mj-cs"/>
+              </a:defRPr>
+            </a:lvl1pPr>
+          </a:lstStyle>
+          <a:p>
+            <a:r>
+              <a:rPr lang="en-US" altLang="ko-KR" sz="2000" b="1" dirty="0" smtClean="0">
+                <a:latin typeface="Verdana" panose="020B0604030504040204" pitchFamily="34" charset="0"/>
+                <a:ea typeface="Verdana" panose="020B0604030504040204" pitchFamily="34" charset="0"/>
+              </a:rPr>
+              <a:t>Security Analysis</a:t>
+            </a:r>
+            <a:endParaRPr lang="ko-KR" altLang="en-US" sz="2000" b="1" dirty="0">
+              <a:latin typeface="Verdana" panose="020B0604030504040204" pitchFamily="34" charset="0"/>
+            </a:endParaRPr>
+          </a:p>
+        </p:txBody>
+      </p:sp>
+      <p:graphicFrame>
+        <p:nvGraphicFramePr>
+          <p:cNvPr id="3" name="표 2"/>
+          <p:cNvGraphicFramePr>
+            <a:graphicFrameLocks noGrp="1"/>
+          </p:cNvGraphicFramePr>
+          <p:nvPr/>
+        </p:nvGraphicFramePr>
+        <p:xfrm>
+          <a:off x="888763" y="1854437"/>
+          <a:ext cx="8127999" cy="1076960"/>
+        </p:xfrm>
+        <a:graphic>
+          <a:graphicData uri="http://schemas.openxmlformats.org/drawingml/2006/table">
+            <a:tbl>
+              <a:tblPr firstRow="1" bandRow="1">
+                <a:tableStyleId>{5C22544A-7EE6-4342-B048-85BDC9FD1C3A}</a:tableStyleId>
+              </a:tblPr>
+              <a:tblGrid>
+                <a:gridCol w="1647645"/>
+                <a:gridCol w="3771021"/>
+                <a:gridCol w="2709333"/>
+              </a:tblGrid>
+              <a:tr h="186298">
+                <a:tc>
+                  <a:txBody>
+                    <a:bodyPr/>
+                    <a:lstStyle/>
+                    <a:p>
+                      <a:pPr latinLnBrk="1"/>
+                      <a:r>
+                        <a:rPr lang="en-US" altLang="ko-KR" sz="1600" dirty="0" smtClean="0">
+                          <a:latin typeface="Verdana" panose="020B0604030504040204" pitchFamily="34" charset="0"/>
+                          <a:ea typeface="Verdana" panose="020B0604030504040204" pitchFamily="34" charset="0"/>
+                        </a:rPr>
+                        <a:t>System</a:t>
+                      </a:r>
+                      <a:endParaRPr lang="ko-KR" altLang="en-US" sz="1600" dirty="0">
+                        <a:latin typeface="Verdana" panose="020B0604030504040204" pitchFamily="34" charset="0"/>
+                      </a:endParaRPr>
+                    </a:p>
+                  </a:txBody>
+                  <a:tcPr/>
+                </a:tc>
+                <a:tc>
+                  <a:txBody>
+                    <a:bodyPr/>
+                    <a:lstStyle/>
+                    <a:p>
+                      <a:pPr latinLnBrk="1"/>
+                      <a:r>
+                        <a:rPr lang="en-US" altLang="ko-KR" sz="1600" dirty="0" smtClean="0">
+                          <a:latin typeface="Verdana" panose="020B0604030504040204" pitchFamily="34" charset="0"/>
+                          <a:ea typeface="Verdana" panose="020B0604030504040204" pitchFamily="34" charset="0"/>
+                        </a:rPr>
+                        <a:t>Found</a:t>
+                      </a:r>
+                      <a:endParaRPr lang="ko-KR" altLang="en-US" sz="1600">
+                        <a:latin typeface="Verdana" panose="020B0604030504040204" pitchFamily="34" charset="0"/>
+                      </a:endParaRPr>
+                    </a:p>
+                  </a:txBody>
+                  <a:tcPr/>
+                </a:tc>
+                <a:tc>
+                  <a:txBody>
+                    <a:bodyPr/>
+                    <a:lstStyle/>
+                    <a:p>
+                      <a:pPr latinLnBrk="1"/>
+                      <a:r>
+                        <a:rPr lang="en-US" altLang="ko-KR" sz="1600" dirty="0" smtClean="0">
+                          <a:latin typeface="Verdana" panose="020B0604030504040204" pitchFamily="34" charset="0"/>
+                          <a:ea typeface="Verdana" panose="020B0604030504040204" pitchFamily="34" charset="0"/>
+                        </a:rPr>
+                        <a:t>Fixed</a:t>
+                      </a:r>
+                      <a:endParaRPr lang="ko-KR" altLang="en-US" sz="1600">
+                        <a:latin typeface="Verdana" panose="020B0604030504040204" pitchFamily="34" charset="0"/>
+                      </a:endParaRPr>
+                    </a:p>
+                  </a:txBody>
+                  <a:tcPr/>
+                </a:tc>
+              </a:tr>
+              <a:tr h="370840">
+                <a:tc>
+                  <a:txBody>
+                    <a:bodyPr/>
+                    <a:lstStyle/>
+                    <a:p>
+                      <a:pPr latinLnBrk="1"/>
+                      <a:r>
+                        <a:rPr lang="en-US" altLang="ko-KR" sz="1600" dirty="0" smtClean="0">
+                          <a:latin typeface="Verdana" panose="020B0604030504040204" pitchFamily="34" charset="0"/>
+                          <a:ea typeface="Verdana" panose="020B0604030504040204" pitchFamily="34" charset="0"/>
+                        </a:rPr>
+                        <a:t>GSC</a:t>
+                      </a:r>
+                      <a:endParaRPr lang="ko-KR" altLang="en-US" sz="1600">
+                        <a:latin typeface="Verdana" panose="020B0604030504040204" pitchFamily="34" charset="0"/>
+                      </a:endParaRPr>
+                    </a:p>
+                  </a:txBody>
+                  <a:tcPr/>
+                </a:tc>
+                <a:tc>
+                  <a:txBody>
+                    <a:bodyPr/>
+                    <a:lstStyle/>
+                    <a:p>
+                      <a:pPr latinLnBrk="1"/>
+                      <a:r>
+                        <a:rPr lang="en-US" altLang="ko-KR" sz="1600" dirty="0" smtClean="0">
+                          <a:latin typeface="Verdana" panose="020B0604030504040204" pitchFamily="34" charset="0"/>
+                          <a:ea typeface="Verdana" panose="020B0604030504040204" pitchFamily="34" charset="0"/>
+                        </a:rPr>
+                        <a:t>5</a:t>
+                      </a:r>
+                      <a:endParaRPr lang="ko-KR" altLang="en-US" sz="1600">
+                        <a:latin typeface="Verdana" panose="020B0604030504040204" pitchFamily="34" charset="0"/>
+                      </a:endParaRPr>
+                    </a:p>
+                  </a:txBody>
+                  <a:tcPr/>
+                </a:tc>
+                <a:tc>
+                  <a:txBody>
+                    <a:bodyPr/>
+                    <a:lstStyle/>
+                    <a:p>
+                      <a:pPr latinLnBrk="1"/>
+                      <a:r>
+                        <a:rPr lang="en-US" altLang="ko-KR" sz="1600" dirty="0" smtClean="0">
+                          <a:latin typeface="Verdana" panose="020B0604030504040204" pitchFamily="34" charset="0"/>
+                          <a:ea typeface="Verdana" panose="020B0604030504040204" pitchFamily="34" charset="0"/>
+                        </a:rPr>
+                        <a:t>5</a:t>
+                      </a:r>
+                      <a:endParaRPr lang="ko-KR" altLang="en-US" sz="1600">
+                        <a:latin typeface="Verdana" panose="020B0604030504040204" pitchFamily="34" charset="0"/>
+                      </a:endParaRPr>
+                    </a:p>
+                  </a:txBody>
+                  <a:tcPr/>
+                </a:tc>
+              </a:tr>
+              <a:tr h="370840">
+                <a:tc>
+                  <a:txBody>
+                    <a:bodyPr/>
+                    <a:lstStyle/>
+                    <a:p>
+                      <a:pPr latinLnBrk="1"/>
+                      <a:r>
+                        <a:rPr lang="en-US" altLang="ko-KR" sz="1600" dirty="0" smtClean="0">
+                          <a:latin typeface="Verdana" panose="020B0604030504040204" pitchFamily="34" charset="0"/>
+                          <a:ea typeface="Verdana" panose="020B0604030504040204" pitchFamily="34" charset="0"/>
+                        </a:rPr>
+                        <a:t>GSS</a:t>
+                      </a:r>
+                      <a:endParaRPr lang="ko-KR" altLang="en-US" sz="1600" dirty="0">
+                        <a:latin typeface="Verdana" panose="020B0604030504040204" pitchFamily="34" charset="0"/>
+                      </a:endParaRPr>
+                    </a:p>
+                  </a:txBody>
+                  <a:tcPr/>
+                </a:tc>
+                <a:tc>
+                  <a:txBody>
+                    <a:bodyPr/>
+                    <a:lstStyle/>
+                    <a:p>
+                      <a:pPr latinLnBrk="1"/>
+                      <a:r>
+                        <a:rPr lang="en-US" altLang="ko-KR" sz="1600" dirty="0" smtClean="0">
+                          <a:latin typeface="Verdana" panose="020B0604030504040204" pitchFamily="34" charset="0"/>
+                          <a:ea typeface="Verdana" panose="020B0604030504040204" pitchFamily="34" charset="0"/>
+                        </a:rPr>
+                        <a:t>57</a:t>
+                      </a:r>
+                      <a:endParaRPr lang="ko-KR" altLang="en-US" sz="1600">
+                        <a:latin typeface="Verdana" panose="020B0604030504040204" pitchFamily="34" charset="0"/>
+                      </a:endParaRPr>
+                    </a:p>
+                  </a:txBody>
+                  <a:tcPr/>
+                </a:tc>
+                <a:tc>
+                  <a:txBody>
+                    <a:bodyPr/>
+                    <a:lstStyle/>
+                    <a:p>
+                      <a:pPr latinLnBrk="1"/>
+                      <a:r>
+                        <a:rPr lang="en-US" altLang="ko-KR" sz="1600" dirty="0" smtClean="0">
+                          <a:latin typeface="Verdana" panose="020B0604030504040204" pitchFamily="34" charset="0"/>
+                          <a:ea typeface="Verdana" panose="020B0604030504040204" pitchFamily="34" charset="0"/>
+                        </a:rPr>
+                        <a:t>3</a:t>
+                      </a:r>
+                      <a:endParaRPr lang="ko-KR" altLang="en-US" sz="1600">
+                        <a:latin typeface="Verdana" panose="020B0604030504040204" pitchFamily="34" charset="0"/>
+                      </a:endParaRPr>
+                    </a:p>
+                  </a:txBody>
+                  <a:tcPr/>
+                </a:tc>
+              </a:tr>
+            </a:tbl>
+          </a:graphicData>
+        </a:graphic>
+      </p:graphicFrame>
+      <p:graphicFrame>
+        <p:nvGraphicFramePr>
+          <p:cNvPr id="4" name="개체 3"/>
+          <p:cNvGraphicFramePr>
+            <a:graphicFrameLocks noChangeAspect="1"/>
+          </p:cNvGraphicFramePr>
+          <p:nvPr/>
+        </p:nvGraphicFramePr>
+        <p:xfrm>
+          <a:off x="5344652" y="370121"/>
+          <a:ext cx="914400" cy="771525"/>
+        </p:xfrm>
+        <a:graphic>
+          <a:graphicData uri="http://schemas.openxmlformats.org/presentationml/2006/ole">
+            <mc:AlternateContent xmlns:mc="http://schemas.openxmlformats.org/markup-compatibility/2006">
+              <mc:Choice xmlns:v="urn:schemas-microsoft-com:vml" Requires="v">
+                <p:oleObj spid="_x0000_s4098" name="워크시트" showAsIcon="1" r:id="rId3" imgW="914400" imgH="771480" progId="Excel.Sheet.12">
+                  <p:link updateAutomatic="1"/>
+                </p:oleObj>
+              </mc:Choice>
+              <mc:Fallback>
+                <p:oleObj name="워크시트" showAsIcon="1" r:id="rId3" imgW="914400" imgH="771480" progId="Excel.Sheet.12">
+                  <p:link updateAutomatic="1"/>
+                  <p:pic>
+                    <p:nvPicPr>
+                      <p:cNvPr id="0" name=""/>
+                      <p:cNvPicPr/>
+                      <p:nvPr/>
+                    </p:nvPicPr>
+                    <p:blipFill>
+                      <a:blip r:embed="rId4"/>
+                      <a:stretch>
+                        <a:fillRect/>
+                      </a:stretch>
+                    </p:blipFill>
+                    <p:spPr>
+                      <a:xfrm>
+                        <a:off x="5344652" y="370121"/>
+                        <a:ext cx="914400" cy="771525"/>
+                      </a:xfrm>
+                      <a:prstGeom prst="rect">
+                        <a:avLst/>
+                      </a:prstGeom>
+                    </p:spPr>
+                  </p:pic>
+                </p:oleObj>
+              </mc:Fallback>
+            </mc:AlternateContent>
+          </a:graphicData>
+        </a:graphic>
+      </p:graphicFrame>
+      <p:sp>
+        <p:nvSpPr>
+          <p:cNvPr id="5" name="TextBox 4"/>
+          <p:cNvSpPr txBox="1"/>
+          <p:nvPr/>
+        </p:nvSpPr>
+        <p:spPr>
+          <a:xfrm>
+            <a:off x="888763" y="1375873"/>
+            <a:ext cx="2033899" cy="323165"/>
+          </a:xfrm>
+          <a:prstGeom prst="rect">
+            <a:avLst/>
+          </a:prstGeom>
+          <a:noFill/>
+        </p:spPr>
+        <p:txBody>
+          <a:bodyPr wrap="square" rtlCol="0">
+            <a:spAutoFit/>
+          </a:bodyPr>
+          <a:lstStyle/>
+          <a:p>
+            <a:r>
+              <a:rPr lang="en-US" altLang="ko-KR" sz="1500" dirty="0" smtClean="0">
+                <a:latin typeface="Verdana" panose="020B0604030504040204" pitchFamily="34" charset="0"/>
+                <a:ea typeface="Verdana" panose="020B0604030504040204" pitchFamily="34" charset="0"/>
+              </a:rPr>
+              <a:t>By </a:t>
+            </a:r>
+            <a:r>
+              <a:rPr lang="en-US" altLang="ko-KR" sz="1500" dirty="0" err="1" smtClean="0">
+                <a:latin typeface="Verdana" panose="020B0604030504040204" pitchFamily="34" charset="0"/>
+                <a:ea typeface="Verdana" panose="020B0604030504040204" pitchFamily="34" charset="0"/>
+              </a:rPr>
+              <a:t>Flawfinder</a:t>
+            </a:r>
+            <a:endParaRPr lang="ko-KR" altLang="en-US" sz="1500">
+              <a:latin typeface="Verdana" panose="020B0604030504040204" pitchFamily="34" charset="0"/>
+            </a:endParaRPr>
+          </a:p>
+        </p:txBody>
+      </p:sp>
+      <p:sp>
+        <p:nvSpPr>
+          <p:cNvPr id="6" name="TextBox 5"/>
+          <p:cNvSpPr txBox="1"/>
+          <p:nvPr/>
+        </p:nvSpPr>
+        <p:spPr>
+          <a:xfrm>
+            <a:off x="888762" y="3660492"/>
+            <a:ext cx="2033899" cy="323165"/>
+          </a:xfrm>
+          <a:prstGeom prst="rect">
+            <a:avLst/>
+          </a:prstGeom>
+          <a:noFill/>
+        </p:spPr>
+        <p:txBody>
+          <a:bodyPr wrap="square" rtlCol="0">
+            <a:spAutoFit/>
+          </a:bodyPr>
+          <a:lstStyle/>
+          <a:p>
+            <a:r>
+              <a:rPr lang="en-US" altLang="ko-KR" sz="1500" dirty="0" smtClean="0">
+                <a:latin typeface="Verdana" panose="020B0604030504040204" pitchFamily="34" charset="0"/>
+                <a:ea typeface="Verdana" panose="020B0604030504040204" pitchFamily="34" charset="0"/>
+              </a:rPr>
+              <a:t>Test Case</a:t>
+            </a:r>
+            <a:endParaRPr lang="ko-KR" altLang="en-US" sz="1500">
+              <a:latin typeface="Verdana" panose="020B0604030504040204" pitchFamily="34" charset="0"/>
+            </a:endParaRPr>
+          </a:p>
+        </p:txBody>
+      </p:sp>
+      <p:graphicFrame>
+        <p:nvGraphicFramePr>
+          <p:cNvPr id="7" name="개체 6"/>
+          <p:cNvGraphicFramePr>
+            <a:graphicFrameLocks noChangeAspect="1"/>
+          </p:cNvGraphicFramePr>
+          <p:nvPr/>
+        </p:nvGraphicFramePr>
+        <p:xfrm>
+          <a:off x="2852871" y="3597894"/>
+          <a:ext cx="914400" cy="771525"/>
+        </p:xfrm>
+        <a:graphic>
+          <a:graphicData uri="http://schemas.openxmlformats.org/presentationml/2006/ole">
+            <mc:AlternateContent xmlns:mc="http://schemas.openxmlformats.org/markup-compatibility/2006">
+              <mc:Choice xmlns:v="urn:schemas-microsoft-com:vml" Requires="v">
+                <p:oleObj spid="_x0000_s4099" name="워크시트" showAsIcon="1" r:id="rId5" imgW="914400" imgH="771480" progId="Excel.Sheet.12">
+                  <p:link updateAutomatic="1"/>
+                </p:oleObj>
+              </mc:Choice>
+              <mc:Fallback>
+                <p:oleObj name="워크시트" showAsIcon="1" r:id="rId5" imgW="914400" imgH="771480" progId="Excel.Sheet.12">
+                  <p:link updateAutomatic="1"/>
+                  <p:pic>
+                    <p:nvPicPr>
+                      <p:cNvPr id="0" name=""/>
+                      <p:cNvPicPr/>
+                      <p:nvPr/>
+                    </p:nvPicPr>
+                    <p:blipFill>
+                      <a:blip r:embed="rId6"/>
+                      <a:stretch>
+                        <a:fillRect/>
+                      </a:stretch>
+                    </p:blipFill>
+                    <p:spPr>
+                      <a:xfrm>
+                        <a:off x="2852871" y="3597894"/>
+                        <a:ext cx="914400" cy="771525"/>
+                      </a:xfrm>
+                      <a:prstGeom prst="rect">
+                        <a:avLst/>
+                      </a:prstGeom>
+                    </p:spPr>
+                  </p:pic>
+                </p:oleObj>
+              </mc:Fallback>
+            </mc:AlternateContent>
+          </a:graphicData>
+        </a:graphic>
+      </p:graphicFrame>
+    </p:spTree>
+    <p:extLst>
+      <p:ext uri="{BB962C8B-B14F-4D97-AF65-F5344CB8AC3E}">
+        <p14:creationId xmlns:p14="http://schemas.microsoft.com/office/powerpoint/2010/main" val="1269397904"/>
+      </p:ext>
+    </p:extLst>
+  </p:cSld>
+  <p:clrMapOvr>
+    <a:masterClrMapping/>
+  </p:clrMapOvr>
+</p:sld>
+</file>
+
 <file path=ppt/slides/slide2.xml><?xml version="1.0" encoding="utf-8"?>
+<p:sld xmlns:a="http://schemas.openxmlformats.org/drawingml/2006/main" xmlns:r="http://schemas.openxmlformats.org/officeDocument/2006/relationships" xmlns:p="http://schemas.openxmlformats.org/presentationml/2006/main">
+  <p:cSld>
+    <p:spTree>
+      <p:nvGrpSpPr>
+        <p:cNvPr id="1" name=""/>
+        <p:cNvGrpSpPr/>
+        <p:nvPr/>
+      </p:nvGrpSpPr>
+      <p:grpSpPr>
+        <a:xfrm>
+          <a:off x="0" y="0"/>
+          <a:ext cx="0" cy="0"/>
+          <a:chOff x="0" y="0"/>
+          <a:chExt cx="0" cy="0"/>
+        </a:xfrm>
+      </p:grpSpPr>
+      <p:sp>
+        <p:nvSpPr>
+          <p:cNvPr id="4" name="제목 1"/>
+          <p:cNvSpPr>
+            <a:spLocks noGrp="1"/>
+          </p:cNvSpPr>
+          <p:nvPr>
+            <p:ph type="title"/>
+          </p:nvPr>
+        </p:nvSpPr>
+        <p:spPr>
+          <a:xfrm>
+            <a:off x="581462" y="233916"/>
+            <a:ext cx="10515600" cy="829340"/>
+          </a:xfrm>
+        </p:spPr>
+        <p:txBody>
+          <a:bodyPr>
+            <a:normAutofit/>
+          </a:bodyPr>
+          <a:lstStyle/>
+          <a:p>
+            <a:r>
+              <a:rPr lang="en-US" altLang="ko-KR" sz="2000" b="1" dirty="0" smtClean="0">
+                <a:latin typeface="Verdana" panose="020B0604030504040204" pitchFamily="34" charset="0"/>
+                <a:ea typeface="Verdana" panose="020B0604030504040204" pitchFamily="34" charset="0"/>
+              </a:rPr>
+              <a:t>Security Requirements</a:t>
+            </a:r>
+            <a:endParaRPr lang="ko-KR" altLang="en-US" sz="2000" b="1" dirty="0">
+              <a:latin typeface="Verdana" panose="020B0604030504040204" pitchFamily="34" charset="0"/>
+            </a:endParaRPr>
+          </a:p>
+        </p:txBody>
+      </p:sp>
+      <p:graphicFrame>
+        <p:nvGraphicFramePr>
+          <p:cNvPr id="5" name="표 4"/>
+          <p:cNvGraphicFramePr>
+            <a:graphicFrameLocks noGrp="1"/>
+          </p:cNvGraphicFramePr>
+          <p:nvPr>
+            <p:extLst>
+              <p:ext uri="{D42A27DB-BD31-4B8C-83A1-F6EECF244321}">
+                <p14:modId xmlns:p14="http://schemas.microsoft.com/office/powerpoint/2010/main" val="4217704406"/>
+              </p:ext>
+            </p:extLst>
+          </p:nvPr>
+        </p:nvGraphicFramePr>
+        <p:xfrm>
+          <a:off x="581462" y="1603988"/>
+          <a:ext cx="11063334" cy="1892314"/>
+        </p:xfrm>
+        <a:graphic>
+          <a:graphicData uri="http://schemas.openxmlformats.org/drawingml/2006/table">
+            <a:tbl>
+              <a:tblPr firstRow="1" firstCol="1" bandRow="1">
+                <a:tableStyleId>{5C22544A-7EE6-4342-B048-85BDC9FD1C3A}</a:tableStyleId>
+              </a:tblPr>
+              <a:tblGrid>
+                <a:gridCol w="1454372"/>
+                <a:gridCol w="9608962"/>
+              </a:tblGrid>
+              <a:tr h="352536">
+                <a:tc>
+                  <a:txBody>
+                    <a:bodyPr/>
+                    <a:lstStyle/>
+                    <a:p>
+                      <a:pPr algn="ctr" latinLnBrk="1">
+                        <a:lnSpc>
+                          <a:spcPct val="107000"/>
+                        </a:lnSpc>
+                        <a:spcAft>
+                          <a:spcPts val="0"/>
+                        </a:spcAft>
+                      </a:pPr>
+                      <a:r>
+                        <a:rPr lang="en-US" altLang="ko-KR" sz="1200" kern="100" dirty="0" smtClean="0">
+                          <a:ln>
+                            <a:noFill/>
+                          </a:ln>
+                          <a:solidFill>
+                            <a:schemeClr val="tx1"/>
+                          </a:solidFill>
+                          <a:effectLst/>
+                          <a:latin typeface="Verdana" panose="020B0604030504040204" pitchFamily="34" charset="0"/>
+                          <a:ea typeface="Verdana" panose="020B0604030504040204" pitchFamily="34" charset="0"/>
+                          <a:cs typeface="Arial Unicode MS" panose="020B0604020202020204" pitchFamily="50" charset="-127"/>
+                        </a:rPr>
+                        <a:t>Goals</a:t>
+                      </a:r>
+                      <a:endParaRPr lang="ko-KR" sz="1200" kern="100" dirty="0">
+                        <a:ln>
+                          <a:noFill/>
+                        </a:ln>
+                        <a:solidFill>
+                          <a:schemeClr val="tx1"/>
+                        </a:solidFill>
+                        <a:effectLst/>
+                        <a:latin typeface="Verdana" panose="020B0604030504040204" pitchFamily="34" charset="0"/>
+                        <a:ea typeface="Arial Unicode MS" panose="020B0604020202020204" pitchFamily="50" charset="-127"/>
+                        <a:cs typeface="Arial Unicode MS" panose="020B0604020202020204" pitchFamily="50" charset="-127"/>
+                      </a:endParaRPr>
+                    </a:p>
+                  </a:txBody>
+                  <a:tcPr marL="49969" marR="49969" marT="0" marB="0" anchor="ctr">
+                    <a:lnL w="12700" cap="flat" cmpd="sng" algn="ctr">
+                      <a:solidFill>
+                        <a:schemeClr val="tx1"/>
+                      </a:solidFill>
+                      <a:prstDash val="solid"/>
+                      <a:round/>
+                      <a:headEnd type="none" w="med" len="med"/>
+                      <a:tailEnd type="none" w="med" len="med"/>
+                    </a:lnL>
+                    <a:lnR w="12700" cap="flat" cmpd="sng" algn="ctr">
+                      <a:solidFill>
+                        <a:schemeClr val="tx1"/>
+                      </a:solidFill>
+                      <a:prstDash val="solid"/>
+                      <a:round/>
+                      <a:headEnd type="none" w="med" len="med"/>
+                      <a:tailEnd type="none" w="med" len="med"/>
+                    </a:lnR>
+                    <a:lnT w="12700" cap="flat" cmpd="sng" algn="ctr">
+                      <a:solidFill>
+                        <a:schemeClr val="tx1"/>
+                      </a:solidFill>
+                      <a:prstDash val="solid"/>
+                      <a:round/>
+                      <a:headEnd type="none" w="med" len="med"/>
+                      <a:tailEnd type="none" w="med" len="med"/>
+                    </a:lnT>
+                    <a:lnB w="12700" cap="flat" cmpd="sng" algn="ctr">
+                      <a:solidFill>
+                        <a:schemeClr val="tx1"/>
+                      </a:solidFill>
+                      <a:prstDash val="solid"/>
+                      <a:round/>
+                      <a:headEnd type="none" w="med" len="med"/>
+                      <a:tailEnd type="none" w="med" len="med"/>
+                    </a:lnB>
+                    <a:solidFill>
+                      <a:schemeClr val="bg1">
+                        <a:lumMod val="75000"/>
+                      </a:schemeClr>
+                    </a:solidFill>
+                  </a:tcPr>
+                </a:tc>
+                <a:tc>
+                  <a:txBody>
+                    <a:bodyPr/>
+                    <a:lstStyle/>
+                    <a:p>
+                      <a:pPr algn="ctr" latinLnBrk="1">
+                        <a:lnSpc>
+                          <a:spcPct val="107000"/>
+                        </a:lnSpc>
+                        <a:spcAft>
+                          <a:spcPts val="0"/>
+                        </a:spcAft>
+                      </a:pPr>
+                      <a:r>
+                        <a:rPr lang="en-US" sz="1200" kern="100" dirty="0" smtClean="0">
+                          <a:ln>
+                            <a:noFill/>
+                          </a:ln>
+                          <a:solidFill>
+                            <a:schemeClr val="tx1"/>
+                          </a:solidFill>
+                          <a:effectLst/>
+                          <a:latin typeface="Verdana" panose="020B0604030504040204" pitchFamily="34" charset="0"/>
+                          <a:ea typeface="Verdana" panose="020B0604030504040204" pitchFamily="34" charset="0"/>
+                          <a:cs typeface="Arial Unicode MS" panose="020B0604020202020204" pitchFamily="50" charset="-127"/>
+                        </a:rPr>
+                        <a:t>Contents</a:t>
+                      </a:r>
+                      <a:endParaRPr lang="ko-KR" sz="1200" kern="100" dirty="0">
+                        <a:ln>
+                          <a:noFill/>
+                        </a:ln>
+                        <a:solidFill>
+                          <a:schemeClr val="tx1"/>
+                        </a:solidFill>
+                        <a:effectLst/>
+                        <a:latin typeface="Verdana" panose="020B0604030504040204" pitchFamily="34" charset="0"/>
+                        <a:ea typeface="Arial Unicode MS" panose="020B0604020202020204" pitchFamily="50" charset="-127"/>
+                        <a:cs typeface="Arial Unicode MS" panose="020B0604020202020204" pitchFamily="50" charset="-127"/>
+                      </a:endParaRPr>
+                    </a:p>
+                  </a:txBody>
+                  <a:tcPr marL="49969" marR="49969" marT="0" marB="0" anchor="ctr">
+                    <a:lnL w="12700" cap="flat" cmpd="sng" algn="ctr">
+                      <a:solidFill>
+                        <a:schemeClr val="tx1"/>
+                      </a:solidFill>
+                      <a:prstDash val="solid"/>
+                      <a:round/>
+                      <a:headEnd type="none" w="med" len="med"/>
+                      <a:tailEnd type="none" w="med" len="med"/>
+                    </a:lnL>
+                    <a:lnR w="12700" cap="flat" cmpd="sng" algn="ctr">
+                      <a:solidFill>
+                        <a:schemeClr val="tx1"/>
+                      </a:solidFill>
+                      <a:prstDash val="solid"/>
+                      <a:round/>
+                      <a:headEnd type="none" w="med" len="med"/>
+                      <a:tailEnd type="none" w="med" len="med"/>
+                    </a:lnR>
+                    <a:lnT w="12700" cap="flat" cmpd="sng" algn="ctr">
+                      <a:solidFill>
+                        <a:schemeClr val="tx1"/>
+                      </a:solidFill>
+                      <a:prstDash val="solid"/>
+                      <a:round/>
+                      <a:headEnd type="none" w="med" len="med"/>
+                      <a:tailEnd type="none" w="med" len="med"/>
+                    </a:lnT>
+                    <a:lnB w="12700" cap="flat" cmpd="sng" algn="ctr">
+                      <a:solidFill>
+                        <a:schemeClr val="tx1"/>
+                      </a:solidFill>
+                      <a:prstDash val="solid"/>
+                      <a:round/>
+                      <a:headEnd type="none" w="med" len="med"/>
+                      <a:tailEnd type="none" w="med" len="med"/>
+                    </a:lnB>
+                    <a:solidFill>
+                      <a:schemeClr val="bg1">
+                        <a:lumMod val="75000"/>
+                      </a:schemeClr>
+                    </a:solidFill>
+                  </a:tcPr>
+                </a:tc>
+              </a:tr>
+              <a:tr h="352536">
+                <a:tc>
+                  <a:txBody>
+                    <a:bodyPr/>
+                    <a:lstStyle/>
+                    <a:p>
+                      <a:pPr algn="just" latinLnBrk="1">
+                        <a:lnSpc>
+                          <a:spcPct val="107000"/>
+                        </a:lnSpc>
+                        <a:spcAft>
+                          <a:spcPts val="800"/>
+                        </a:spcAft>
+                      </a:pPr>
+                      <a:r>
+                        <a:rPr lang="en-US" altLang="ko-KR" sz="1200" b="0" kern="100" dirty="0" smtClean="0">
+                          <a:ln>
+                            <a:noFill/>
+                          </a:ln>
+                          <a:solidFill>
+                            <a:schemeClr val="tx1"/>
+                          </a:solidFill>
+                          <a:latin typeface="Verdana" panose="020B0604030504040204" pitchFamily="34" charset="0"/>
+                          <a:ea typeface="Verdana" panose="020B0604030504040204" pitchFamily="34" charset="0"/>
+                          <a:cs typeface="Times New Roman" panose="02020603050405020304" pitchFamily="18" charset="0"/>
+                        </a:rPr>
+                        <a:t>Business Goals</a:t>
+                      </a:r>
+                      <a:endParaRPr lang="ko-KR" sz="1200" b="0" kern="100" dirty="0">
+                        <a:ln>
+                          <a:noFill/>
+                        </a:ln>
+                        <a:solidFill>
+                          <a:schemeClr val="tx1"/>
+                        </a:solidFill>
+                        <a:effectLst/>
+                        <a:latin typeface="Verdana" panose="020B0604030504040204" pitchFamily="34" charset="0"/>
+                        <a:ea typeface="Arial Unicode MS" panose="020B0604020202020204" pitchFamily="50" charset="-127"/>
+                        <a:cs typeface="Arial Unicode MS" panose="020B0604020202020204" pitchFamily="50" charset="-127"/>
+                      </a:endParaRPr>
+                    </a:p>
+                  </a:txBody>
+                  <a:tcPr marL="49969" marR="49969" marT="0" marB="0" anchor="ctr">
+                    <a:lnL w="12700" cap="flat" cmpd="sng" algn="ctr">
+                      <a:solidFill>
+                        <a:schemeClr val="tx1"/>
+                      </a:solidFill>
+                      <a:prstDash val="solid"/>
+                      <a:round/>
+                      <a:headEnd type="none" w="med" len="med"/>
+                      <a:tailEnd type="none" w="med" len="med"/>
+                    </a:lnL>
+                    <a:lnR w="12700" cap="flat" cmpd="sng" algn="ctr">
+                      <a:solidFill>
+                        <a:schemeClr val="tx1"/>
+                      </a:solidFill>
+                      <a:prstDash val="solid"/>
+                      <a:round/>
+                      <a:headEnd type="none" w="med" len="med"/>
+                      <a:tailEnd type="none" w="med" len="med"/>
+                    </a:lnR>
+                    <a:lnT w="12700" cap="flat" cmpd="sng" algn="ctr">
+                      <a:solidFill>
+                        <a:schemeClr val="tx1"/>
+                      </a:solidFill>
+                      <a:prstDash val="solid"/>
+                      <a:round/>
+                      <a:headEnd type="none" w="med" len="med"/>
+                      <a:tailEnd type="none" w="med" len="med"/>
+                    </a:lnT>
+                    <a:lnB w="12700" cap="flat" cmpd="sng" algn="ctr">
+                      <a:solidFill>
+                        <a:schemeClr val="tx1"/>
+                      </a:solidFill>
+                      <a:prstDash val="solid"/>
+                      <a:round/>
+                      <a:headEnd type="none" w="med" len="med"/>
+                      <a:tailEnd type="none" w="med" len="med"/>
+                    </a:lnB>
+                    <a:solidFill>
+                      <a:schemeClr val="bg1"/>
+                    </a:solidFill>
+                  </a:tcPr>
+                </a:tc>
+                <a:tc>
+                  <a:txBody>
+                    <a:bodyPr/>
+                    <a:lstStyle/>
+                    <a:p>
+                      <a:pPr marL="0" lvl="0" indent="0" algn="just">
+                        <a:lnSpc>
+                          <a:spcPct val="107000"/>
+                        </a:lnSpc>
+                        <a:spcAft>
+                          <a:spcPts val="800"/>
+                        </a:spcAft>
+                        <a:buFont typeface="+mj-lt"/>
+                        <a:buNone/>
+                      </a:pPr>
+                      <a:r>
+                        <a:rPr lang="en-US" altLang="ko-KR" sz="1200" kern="100" dirty="0" smtClean="0">
+                          <a:ln>
+                            <a:noFill/>
+                          </a:ln>
+                          <a:solidFill>
+                            <a:schemeClr val="tx1"/>
+                          </a:solidFill>
+                          <a:latin typeface="Verdana" panose="020B0604030504040204" pitchFamily="34" charset="0"/>
+                          <a:ea typeface="Verdana" panose="020B0604030504040204" pitchFamily="34" charset="0"/>
+                          <a:cs typeface="Times New Roman" panose="02020603050405020304" pitchFamily="18" charset="0"/>
+                        </a:rPr>
+                        <a:t>Provide a face recognition system to identify</a:t>
+                      </a:r>
+                      <a:r>
+                        <a:rPr lang="en-US" altLang="ko-KR" sz="1200" kern="100" baseline="0" dirty="0" smtClean="0">
+                          <a:ln>
+                            <a:noFill/>
+                          </a:ln>
+                          <a:solidFill>
+                            <a:schemeClr val="tx1"/>
+                          </a:solidFill>
+                          <a:latin typeface="Verdana" panose="020B0604030504040204" pitchFamily="34" charset="0"/>
+                          <a:ea typeface="Verdana" panose="020B0604030504040204" pitchFamily="34" charset="0"/>
+                          <a:cs typeface="Times New Roman" panose="02020603050405020304" pitchFamily="18" charset="0"/>
+                        </a:rPr>
+                        <a:t> employees.</a:t>
+                      </a:r>
+                      <a:endParaRPr lang="ko-KR" altLang="ko-KR" sz="1200" kern="100" dirty="0">
+                        <a:ln>
+                          <a:noFill/>
+                        </a:ln>
+                        <a:solidFill>
+                          <a:schemeClr val="tx1"/>
+                        </a:solidFill>
+                        <a:latin typeface="Verdana" panose="020B0604030504040204" pitchFamily="34" charset="0"/>
+                        <a:cs typeface="Times New Roman" panose="02020603050405020304" pitchFamily="18" charset="0"/>
+                      </a:endParaRPr>
+                    </a:p>
+                  </a:txBody>
+                  <a:tcPr marL="49969" marR="49969" marT="0" marB="0" anchor="ctr">
+                    <a:lnL w="12700" cap="flat" cmpd="sng" algn="ctr">
+                      <a:solidFill>
+                        <a:schemeClr val="tx1"/>
+                      </a:solidFill>
+                      <a:prstDash val="solid"/>
+                      <a:round/>
+                      <a:headEnd type="none" w="med" len="med"/>
+                      <a:tailEnd type="none" w="med" len="med"/>
+                    </a:lnL>
+                    <a:lnR w="12700" cap="flat" cmpd="sng" algn="ctr">
+                      <a:solidFill>
+                        <a:schemeClr val="tx1"/>
+                      </a:solidFill>
+                      <a:prstDash val="solid"/>
+                      <a:round/>
+                      <a:headEnd type="none" w="med" len="med"/>
+                      <a:tailEnd type="none" w="med" len="med"/>
+                    </a:lnR>
+                    <a:lnT w="12700" cap="flat" cmpd="sng" algn="ctr">
+                      <a:solidFill>
+                        <a:schemeClr val="tx1"/>
+                      </a:solidFill>
+                      <a:prstDash val="solid"/>
+                      <a:round/>
+                      <a:headEnd type="none" w="med" len="med"/>
+                      <a:tailEnd type="none" w="med" len="med"/>
+                    </a:lnT>
+                    <a:lnB w="12700" cap="flat" cmpd="sng" algn="ctr">
+                      <a:solidFill>
+                        <a:schemeClr val="tx1"/>
+                      </a:solidFill>
+                      <a:prstDash val="solid"/>
+                      <a:round/>
+                      <a:headEnd type="none" w="med" len="med"/>
+                      <a:tailEnd type="none" w="med" len="med"/>
+                    </a:lnB>
+                    <a:solidFill>
+                      <a:schemeClr val="bg1"/>
+                    </a:solidFill>
+                  </a:tcPr>
+                </a:tc>
+              </a:tr>
+              <a:tr h="482170">
+                <a:tc rowSpan="3">
+                  <a:txBody>
+                    <a:bodyPr/>
+                    <a:lstStyle/>
+                    <a:p>
+                      <a:pPr algn="just" latinLnBrk="1">
+                        <a:lnSpc>
+                          <a:spcPct val="107000"/>
+                        </a:lnSpc>
+                        <a:spcAft>
+                          <a:spcPts val="0"/>
+                        </a:spcAft>
+                      </a:pPr>
+                      <a:r>
+                        <a:rPr lang="en-US" altLang="ko-KR" sz="1200" b="0" kern="100" dirty="0" smtClean="0">
+                          <a:ln>
+                            <a:noFill/>
+                          </a:ln>
+                          <a:solidFill>
+                            <a:schemeClr val="tx1"/>
+                          </a:solidFill>
+                          <a:latin typeface="Verdana" panose="020B0604030504040204" pitchFamily="34" charset="0"/>
+                          <a:ea typeface="Verdana" panose="020B0604030504040204" pitchFamily="34" charset="0"/>
+                          <a:cs typeface="Times New Roman" panose="02020603050405020304" pitchFamily="18" charset="0"/>
+                        </a:rPr>
+                        <a:t>Security Goals</a:t>
+                      </a:r>
+                      <a:endParaRPr lang="ko-KR" sz="1200" b="0" kern="100" dirty="0">
+                        <a:ln>
+                          <a:noFill/>
+                        </a:ln>
+                        <a:solidFill>
+                          <a:schemeClr val="tx1"/>
+                        </a:solidFill>
+                        <a:effectLst/>
+                        <a:latin typeface="Verdana" panose="020B0604030504040204" pitchFamily="34" charset="0"/>
+                        <a:ea typeface="Arial Unicode MS" panose="020B0604020202020204" pitchFamily="50" charset="-127"/>
+                        <a:cs typeface="Arial Unicode MS" panose="020B0604020202020204" pitchFamily="50" charset="-127"/>
+                      </a:endParaRPr>
+                    </a:p>
+                  </a:txBody>
+                  <a:tcPr marL="49969" marR="49969" marT="0" marB="0" anchor="ctr">
+                    <a:lnL w="12700" cap="flat" cmpd="sng" algn="ctr">
+                      <a:solidFill>
+                        <a:schemeClr val="tx1"/>
+                      </a:solidFill>
+                      <a:prstDash val="solid"/>
+                      <a:round/>
+                      <a:headEnd type="none" w="med" len="med"/>
+                      <a:tailEnd type="none" w="med" len="med"/>
+                    </a:lnL>
+                    <a:lnR w="12700" cap="flat" cmpd="sng" algn="ctr">
+                      <a:solidFill>
+                        <a:schemeClr val="tx1"/>
+                      </a:solidFill>
+                      <a:prstDash val="solid"/>
+                      <a:round/>
+                      <a:headEnd type="none" w="med" len="med"/>
+                      <a:tailEnd type="none" w="med" len="med"/>
+                    </a:lnR>
+                    <a:lnT w="12700" cap="flat" cmpd="sng" algn="ctr">
+                      <a:solidFill>
+                        <a:schemeClr val="tx1"/>
+                      </a:solidFill>
+                      <a:prstDash val="solid"/>
+                      <a:round/>
+                      <a:headEnd type="none" w="med" len="med"/>
+                      <a:tailEnd type="none" w="med" len="med"/>
+                    </a:lnT>
+                    <a:lnB w="12700" cap="flat" cmpd="sng" algn="ctr">
+                      <a:solidFill>
+                        <a:schemeClr val="tx1"/>
+                      </a:solidFill>
+                      <a:prstDash val="solid"/>
+                      <a:round/>
+                      <a:headEnd type="none" w="med" len="med"/>
+                      <a:tailEnd type="none" w="med" len="med"/>
+                    </a:lnB>
+                    <a:solidFill>
+                      <a:schemeClr val="bg1"/>
+                    </a:solidFill>
+                  </a:tcPr>
+                </a:tc>
+                <a:tc>
+                  <a:txBody>
+                    <a:bodyPr/>
+                    <a:lstStyle/>
+                    <a:p>
+                      <a:pPr marL="0" lvl="0" indent="0" algn="just">
+                        <a:lnSpc>
+                          <a:spcPct val="107000"/>
+                        </a:lnSpc>
+                        <a:spcAft>
+                          <a:spcPts val="800"/>
+                        </a:spcAft>
+                        <a:buFont typeface="+mj-lt"/>
+                        <a:buNone/>
+                      </a:pPr>
+                      <a:r>
+                        <a:rPr lang="en-US" altLang="ko-KR" sz="1200" kern="100" dirty="0" smtClean="0">
+                          <a:ln>
+                            <a:noFill/>
+                          </a:ln>
+                          <a:solidFill>
+                            <a:schemeClr val="tx1"/>
+                          </a:solidFill>
+                          <a:latin typeface="Verdana" panose="020B0604030504040204" pitchFamily="34" charset="0"/>
+                          <a:ea typeface="Verdana" panose="020B0604030504040204" pitchFamily="34" charset="0"/>
+                          <a:cs typeface="Times New Roman" panose="02020603050405020304" pitchFamily="18" charset="0"/>
+                        </a:rPr>
+                        <a:t>Recognized face images and image analyzed results which is personal/sensitive information must </a:t>
+                      </a:r>
+                      <a:r>
+                        <a:rPr lang="en-US" altLang="ko-KR" sz="1200" kern="100" smtClean="0">
+                          <a:ln>
+                            <a:noFill/>
+                          </a:ln>
+                          <a:solidFill>
+                            <a:schemeClr val="tx1"/>
+                          </a:solidFill>
+                          <a:latin typeface="Verdana" panose="020B0604030504040204" pitchFamily="34" charset="0"/>
+                          <a:ea typeface="Verdana" panose="020B0604030504040204" pitchFamily="34" charset="0"/>
+                          <a:cs typeface="Times New Roman" panose="02020603050405020304" pitchFamily="18" charset="0"/>
+                        </a:rPr>
+                        <a:t>be protected</a:t>
+                      </a:r>
+                      <a:endParaRPr lang="ko-KR" altLang="ko-KR" sz="1200" kern="100" dirty="0">
+                        <a:ln>
+                          <a:noFill/>
+                        </a:ln>
+                        <a:solidFill>
+                          <a:schemeClr val="tx1"/>
+                        </a:solidFill>
+                        <a:latin typeface="Verdana" panose="020B0604030504040204" pitchFamily="34" charset="0"/>
+                        <a:cs typeface="Times New Roman" panose="02020603050405020304" pitchFamily="18" charset="0"/>
+                      </a:endParaRPr>
+                    </a:p>
+                  </a:txBody>
+                  <a:tcPr marL="49969" marR="49969" marT="0" marB="0" anchor="ctr">
+                    <a:lnL w="12700" cap="flat" cmpd="sng" algn="ctr">
+                      <a:solidFill>
+                        <a:schemeClr val="tx1"/>
+                      </a:solidFill>
+                      <a:prstDash val="solid"/>
+                      <a:round/>
+                      <a:headEnd type="none" w="med" len="med"/>
+                      <a:tailEnd type="none" w="med" len="med"/>
+                    </a:lnL>
+                    <a:lnR w="12700" cap="flat" cmpd="sng" algn="ctr">
+                      <a:solidFill>
+                        <a:schemeClr val="tx1"/>
+                      </a:solidFill>
+                      <a:prstDash val="solid"/>
+                      <a:round/>
+                      <a:headEnd type="none" w="med" len="med"/>
+                      <a:tailEnd type="none" w="med" len="med"/>
+                    </a:lnR>
+                    <a:lnT w="12700" cap="flat" cmpd="sng" algn="ctr">
+                      <a:solidFill>
+                        <a:schemeClr val="tx1"/>
+                      </a:solidFill>
+                      <a:prstDash val="solid"/>
+                      <a:round/>
+                      <a:headEnd type="none" w="med" len="med"/>
+                      <a:tailEnd type="none" w="med" len="med"/>
+                    </a:lnT>
+                    <a:lnB w="12700" cap="flat" cmpd="sng" algn="ctr">
+                      <a:solidFill>
+                        <a:schemeClr val="tx1"/>
+                      </a:solidFill>
+                      <a:prstDash val="solid"/>
+                      <a:round/>
+                      <a:headEnd type="none" w="med" len="med"/>
+                      <a:tailEnd type="none" w="med" len="med"/>
+                    </a:lnB>
+                    <a:solidFill>
+                      <a:schemeClr val="bg1"/>
+                    </a:solidFill>
+                  </a:tcPr>
+                </a:tc>
+              </a:tr>
+              <a:tr h="352536">
+                <a:tc vMerge="1">
+                  <a:txBody>
+                    <a:bodyPr/>
+                    <a:lstStyle/>
+                    <a:p>
+                      <a:pPr latinLnBrk="1"/>
+                      <a:endParaRPr lang="ko-KR" altLang="en-US"/>
+                    </a:p>
+                  </a:txBody>
+                  <a:tcPr/>
+                </a:tc>
+                <a:tc>
+                  <a:txBody>
+                    <a:bodyPr/>
+                    <a:lstStyle/>
+                    <a:p>
+                      <a:pPr marL="0" marR="0" lvl="0" indent="0" algn="just" defTabSz="914400" rtl="0" eaLnBrk="1" fontAlgn="auto" latinLnBrk="1" hangingPunct="1">
+                        <a:lnSpc>
+                          <a:spcPct val="107000"/>
+                        </a:lnSpc>
+                        <a:spcBef>
+                          <a:spcPts val="0"/>
+                        </a:spcBef>
+                        <a:spcAft>
+                          <a:spcPts val="800"/>
+                        </a:spcAft>
+                        <a:buClrTx/>
+                        <a:buSzTx/>
+                        <a:buFont typeface="+mj-lt"/>
+                        <a:buNone/>
+                        <a:tabLst/>
+                        <a:defRPr/>
+                      </a:pPr>
+                      <a:r>
+                        <a:rPr lang="en-US" altLang="ko-KR" sz="1200" kern="100" dirty="0" smtClean="0">
+                          <a:ln>
+                            <a:noFill/>
+                          </a:ln>
+                          <a:solidFill>
+                            <a:schemeClr val="tx1"/>
+                          </a:solidFill>
+                          <a:latin typeface="Verdana" panose="020B0604030504040204" pitchFamily="34" charset="0"/>
+                          <a:ea typeface="Verdana" panose="020B0604030504040204" pitchFamily="34" charset="0"/>
+                          <a:cs typeface="Times New Roman" panose="02020603050405020304" pitchFamily="18" charset="0"/>
+                        </a:rPr>
+                        <a:t>User credential and stored images have to be protected.</a:t>
+                      </a:r>
+                      <a:endParaRPr lang="ko-KR" altLang="ko-KR" sz="1200" kern="100" dirty="0">
+                        <a:ln>
+                          <a:noFill/>
+                        </a:ln>
+                        <a:solidFill>
+                          <a:schemeClr val="tx1"/>
+                        </a:solidFill>
+                        <a:latin typeface="Verdana" panose="020B0604030504040204" pitchFamily="34" charset="0"/>
+                        <a:cs typeface="Times New Roman" panose="02020603050405020304" pitchFamily="18" charset="0"/>
+                      </a:endParaRPr>
+                    </a:p>
+                  </a:txBody>
+                  <a:tcPr marL="49969" marR="49969" marT="0" marB="0" anchor="ctr">
+                    <a:lnL w="12700" cap="flat" cmpd="sng" algn="ctr">
+                      <a:solidFill>
+                        <a:schemeClr val="tx1"/>
+                      </a:solidFill>
+                      <a:prstDash val="solid"/>
+                      <a:round/>
+                      <a:headEnd type="none" w="med" len="med"/>
+                      <a:tailEnd type="none" w="med" len="med"/>
+                    </a:lnL>
+                    <a:lnR w="12700" cap="flat" cmpd="sng" algn="ctr">
+                      <a:solidFill>
+                        <a:schemeClr val="tx1"/>
+                      </a:solidFill>
+                      <a:prstDash val="solid"/>
+                      <a:round/>
+                      <a:headEnd type="none" w="med" len="med"/>
+                      <a:tailEnd type="none" w="med" len="med"/>
+                    </a:lnR>
+                    <a:lnT w="12700" cap="flat" cmpd="sng" algn="ctr">
+                      <a:solidFill>
+                        <a:schemeClr val="tx1"/>
+                      </a:solidFill>
+                      <a:prstDash val="solid"/>
+                      <a:round/>
+                      <a:headEnd type="none" w="med" len="med"/>
+                      <a:tailEnd type="none" w="med" len="med"/>
+                    </a:lnT>
+                    <a:lnB w="12700" cap="flat" cmpd="sng" algn="ctr">
+                      <a:solidFill>
+                        <a:schemeClr val="tx1"/>
+                      </a:solidFill>
+                      <a:prstDash val="solid"/>
+                      <a:round/>
+                      <a:headEnd type="none" w="med" len="med"/>
+                      <a:tailEnd type="none" w="med" len="med"/>
+                    </a:lnB>
+                    <a:solidFill>
+                      <a:schemeClr val="bg1"/>
+                    </a:solidFill>
+                  </a:tcPr>
+                </a:tc>
+              </a:tr>
+              <a:tr h="352536">
+                <a:tc vMerge="1">
+                  <a:txBody>
+                    <a:bodyPr/>
+                    <a:lstStyle/>
+                    <a:p>
+                      <a:pPr latinLnBrk="1"/>
+                      <a:endParaRPr lang="ko-KR" altLang="en-US"/>
+                    </a:p>
+                  </a:txBody>
+                  <a:tcPr/>
+                </a:tc>
+                <a:tc>
+                  <a:txBody>
+                    <a:bodyPr/>
+                    <a:lstStyle/>
+                    <a:p>
+                      <a:pPr marL="0" lvl="0" indent="0" algn="just">
+                        <a:lnSpc>
+                          <a:spcPct val="107000"/>
+                        </a:lnSpc>
+                        <a:spcAft>
+                          <a:spcPts val="800"/>
+                        </a:spcAft>
+                        <a:buFont typeface="+mj-lt"/>
+                        <a:buNone/>
+                      </a:pPr>
+                      <a:r>
+                        <a:rPr lang="en-US" altLang="ko-KR" sz="1200" kern="100" dirty="0" smtClean="0">
+                          <a:ln>
+                            <a:noFill/>
+                          </a:ln>
+                          <a:solidFill>
+                            <a:schemeClr val="tx1"/>
+                          </a:solidFill>
+                          <a:latin typeface="Verdana" panose="020B0604030504040204" pitchFamily="34" charset="0"/>
+                          <a:ea typeface="Verdana" panose="020B0604030504040204" pitchFamily="34" charset="0"/>
+                          <a:cs typeface="Times New Roman" panose="02020603050405020304" pitchFamily="18" charset="0"/>
+                        </a:rPr>
+                        <a:t>Security weakness and vulnerabilities after launching the system must be minimized as much as possible. </a:t>
+                      </a:r>
+                      <a:endParaRPr lang="ko-KR" altLang="ko-KR" sz="1200" kern="100" dirty="0">
+                        <a:ln>
+                          <a:noFill/>
+                        </a:ln>
+                        <a:solidFill>
+                          <a:schemeClr val="tx1"/>
+                        </a:solidFill>
+                        <a:latin typeface="Verdana" panose="020B0604030504040204" pitchFamily="34" charset="0"/>
+                        <a:cs typeface="Times New Roman" panose="02020603050405020304" pitchFamily="18" charset="0"/>
+                      </a:endParaRPr>
+                    </a:p>
+                  </a:txBody>
+                  <a:tcPr marL="49969" marR="49969" marT="0" marB="0" anchor="ctr">
+                    <a:lnL w="12700" cap="flat" cmpd="sng" algn="ctr">
+                      <a:solidFill>
+                        <a:schemeClr val="tx1"/>
+                      </a:solidFill>
+                      <a:prstDash val="solid"/>
+                      <a:round/>
+                      <a:headEnd type="none" w="med" len="med"/>
+                      <a:tailEnd type="none" w="med" len="med"/>
+                    </a:lnL>
+                    <a:lnR w="12700" cap="flat" cmpd="sng" algn="ctr">
+                      <a:solidFill>
+                        <a:schemeClr val="tx1"/>
+                      </a:solidFill>
+                      <a:prstDash val="solid"/>
+                      <a:round/>
+                      <a:headEnd type="none" w="med" len="med"/>
+                      <a:tailEnd type="none" w="med" len="med"/>
+                    </a:lnR>
+                    <a:lnT w="12700" cap="flat" cmpd="sng" algn="ctr">
+                      <a:solidFill>
+                        <a:schemeClr val="tx1"/>
+                      </a:solidFill>
+                      <a:prstDash val="solid"/>
+                      <a:round/>
+                      <a:headEnd type="none" w="med" len="med"/>
+                      <a:tailEnd type="none" w="med" len="med"/>
+                    </a:lnT>
+                    <a:lnB w="12700" cap="flat" cmpd="sng" algn="ctr">
+                      <a:solidFill>
+                        <a:schemeClr val="tx1"/>
+                      </a:solidFill>
+                      <a:prstDash val="solid"/>
+                      <a:round/>
+                      <a:headEnd type="none" w="med" len="med"/>
+                      <a:tailEnd type="none" w="med" len="med"/>
+                    </a:lnB>
+                    <a:solidFill>
+                      <a:schemeClr val="bg1"/>
+                    </a:solidFill>
+                  </a:tcPr>
+                </a:tc>
+              </a:tr>
+            </a:tbl>
+          </a:graphicData>
+        </a:graphic>
+      </p:graphicFrame>
+      <p:graphicFrame>
+        <p:nvGraphicFramePr>
+          <p:cNvPr id="7" name="표 6"/>
+          <p:cNvGraphicFramePr>
+            <a:graphicFrameLocks noGrp="1"/>
+          </p:cNvGraphicFramePr>
+          <p:nvPr>
+            <p:extLst/>
+          </p:nvPr>
+        </p:nvGraphicFramePr>
+        <p:xfrm>
+          <a:off x="581462" y="4088990"/>
+          <a:ext cx="11063334" cy="2285194"/>
+        </p:xfrm>
+        <a:graphic>
+          <a:graphicData uri="http://schemas.openxmlformats.org/drawingml/2006/table">
+            <a:tbl>
+              <a:tblPr firstRow="1" firstCol="1" bandRow="1">
+                <a:tableStyleId>{5C22544A-7EE6-4342-B048-85BDC9FD1C3A}</a:tableStyleId>
+              </a:tblPr>
+              <a:tblGrid>
+                <a:gridCol w="3377695"/>
+                <a:gridCol w="7685639"/>
+              </a:tblGrid>
+              <a:tr h="249612">
+                <a:tc>
+                  <a:txBody>
+                    <a:bodyPr/>
+                    <a:lstStyle/>
+                    <a:p>
+                      <a:pPr algn="ctr" latinLnBrk="1">
+                        <a:lnSpc>
+                          <a:spcPct val="107000"/>
+                        </a:lnSpc>
+                        <a:spcAft>
+                          <a:spcPts val="0"/>
+                        </a:spcAft>
+                      </a:pPr>
+                      <a:r>
+                        <a:rPr lang="en-US" altLang="ko-KR" sz="1200" b="1" kern="100" dirty="0" smtClean="0">
+                          <a:ln>
+                            <a:noFill/>
+                          </a:ln>
+                          <a:solidFill>
+                            <a:schemeClr val="tx1"/>
+                          </a:solidFill>
+                          <a:latin typeface="Verdana" panose="020B0604030504040204" pitchFamily="34" charset="0"/>
+                          <a:ea typeface="Verdana" panose="020B0604030504040204" pitchFamily="34" charset="0"/>
+                          <a:cs typeface="Times New Roman" panose="02020603050405020304" pitchFamily="18" charset="0"/>
+                        </a:rPr>
+                        <a:t>Assets</a:t>
+                      </a:r>
+                      <a:endParaRPr lang="ko-KR" sz="1200" kern="100" dirty="0">
+                        <a:ln>
+                          <a:noFill/>
+                        </a:ln>
+                        <a:solidFill>
+                          <a:schemeClr val="tx1"/>
+                        </a:solidFill>
+                        <a:effectLst/>
+                        <a:latin typeface="Verdana" panose="020B0604030504040204" pitchFamily="34" charset="0"/>
+                        <a:ea typeface="Arial Unicode MS" panose="020B0604020202020204" pitchFamily="50" charset="-127"/>
+                        <a:cs typeface="Arial Unicode MS" panose="020B0604020202020204" pitchFamily="50" charset="-127"/>
+                      </a:endParaRPr>
+                    </a:p>
+                  </a:txBody>
+                  <a:tcPr marL="49969" marR="49969" marT="0" marB="0" anchor="ctr">
+                    <a:lnL w="12700" cap="flat" cmpd="sng" algn="ctr">
+                      <a:solidFill>
+                        <a:schemeClr val="tx1"/>
+                      </a:solidFill>
+                      <a:prstDash val="solid"/>
+                      <a:round/>
+                      <a:headEnd type="none" w="med" len="med"/>
+                      <a:tailEnd type="none" w="med" len="med"/>
+                    </a:lnL>
+                    <a:lnR w="12700" cap="flat" cmpd="sng" algn="ctr">
+                      <a:solidFill>
+                        <a:schemeClr val="tx1"/>
+                      </a:solidFill>
+                      <a:prstDash val="solid"/>
+                      <a:round/>
+                      <a:headEnd type="none" w="med" len="med"/>
+                      <a:tailEnd type="none" w="med" len="med"/>
+                    </a:lnR>
+                    <a:lnT w="12700" cap="flat" cmpd="sng" algn="ctr">
+                      <a:solidFill>
+                        <a:schemeClr val="tx1"/>
+                      </a:solidFill>
+                      <a:prstDash val="solid"/>
+                      <a:round/>
+                      <a:headEnd type="none" w="med" len="med"/>
+                      <a:tailEnd type="none" w="med" len="med"/>
+                    </a:lnT>
+                    <a:lnB w="12700" cap="flat" cmpd="sng" algn="ctr">
+                      <a:solidFill>
+                        <a:schemeClr val="tx1"/>
+                      </a:solidFill>
+                      <a:prstDash val="solid"/>
+                      <a:round/>
+                      <a:headEnd type="none" w="med" len="med"/>
+                      <a:tailEnd type="none" w="med" len="med"/>
+                    </a:lnB>
+                    <a:solidFill>
+                      <a:schemeClr val="bg1">
+                        <a:lumMod val="75000"/>
+                      </a:schemeClr>
+                    </a:solidFill>
+                  </a:tcPr>
+                </a:tc>
+                <a:tc>
+                  <a:txBody>
+                    <a:bodyPr/>
+                    <a:lstStyle/>
+                    <a:p>
+                      <a:pPr algn="ctr" latinLnBrk="1">
+                        <a:lnSpc>
+                          <a:spcPct val="107000"/>
+                        </a:lnSpc>
+                        <a:spcAft>
+                          <a:spcPts val="0"/>
+                        </a:spcAft>
+                      </a:pPr>
+                      <a:r>
+                        <a:rPr lang="en-US" altLang="ko-KR" sz="1200" kern="100" dirty="0" smtClean="0">
+                          <a:ln>
+                            <a:noFill/>
+                          </a:ln>
+                          <a:solidFill>
+                            <a:schemeClr val="tx1"/>
+                          </a:solidFill>
+                          <a:effectLst/>
+                          <a:latin typeface="Verdana" panose="020B0604030504040204" pitchFamily="34" charset="0"/>
+                          <a:ea typeface="Arial Unicode MS" panose="020B0604020202020204" pitchFamily="50" charset="-127"/>
+                          <a:cs typeface="Arial Unicode MS" panose="020B0604020202020204" pitchFamily="50" charset="-127"/>
+                        </a:rPr>
+                        <a:t>Location</a:t>
+                      </a:r>
+                      <a:endParaRPr lang="ko-KR" sz="1200" kern="100" dirty="0">
+                        <a:ln>
+                          <a:noFill/>
+                        </a:ln>
+                        <a:solidFill>
+                          <a:schemeClr val="tx1"/>
+                        </a:solidFill>
+                        <a:effectLst/>
+                        <a:latin typeface="Verdana" panose="020B0604030504040204" pitchFamily="34" charset="0"/>
+                        <a:ea typeface="Arial Unicode MS" panose="020B0604020202020204" pitchFamily="50" charset="-127"/>
+                        <a:cs typeface="Arial Unicode MS" panose="020B0604020202020204" pitchFamily="50" charset="-127"/>
+                      </a:endParaRPr>
+                    </a:p>
+                  </a:txBody>
+                  <a:tcPr marL="49969" marR="49969" marT="0" marB="0" anchor="ctr">
+                    <a:lnL w="12700" cap="flat" cmpd="sng" algn="ctr">
+                      <a:solidFill>
+                        <a:schemeClr val="tx1"/>
+                      </a:solidFill>
+                      <a:prstDash val="solid"/>
+                      <a:round/>
+                      <a:headEnd type="none" w="med" len="med"/>
+                      <a:tailEnd type="none" w="med" len="med"/>
+                    </a:lnL>
+                    <a:lnR w="12700" cap="flat" cmpd="sng" algn="ctr">
+                      <a:solidFill>
+                        <a:schemeClr val="tx1"/>
+                      </a:solidFill>
+                      <a:prstDash val="solid"/>
+                      <a:round/>
+                      <a:headEnd type="none" w="med" len="med"/>
+                      <a:tailEnd type="none" w="med" len="med"/>
+                    </a:lnR>
+                    <a:lnT w="12700" cap="flat" cmpd="sng" algn="ctr">
+                      <a:solidFill>
+                        <a:schemeClr val="tx1"/>
+                      </a:solidFill>
+                      <a:prstDash val="solid"/>
+                      <a:round/>
+                      <a:headEnd type="none" w="med" len="med"/>
+                      <a:tailEnd type="none" w="med" len="med"/>
+                    </a:lnT>
+                    <a:lnB w="12700" cap="flat" cmpd="sng" algn="ctr">
+                      <a:solidFill>
+                        <a:schemeClr val="tx1"/>
+                      </a:solidFill>
+                      <a:prstDash val="solid"/>
+                      <a:round/>
+                      <a:headEnd type="none" w="med" len="med"/>
+                      <a:tailEnd type="none" w="med" len="med"/>
+                    </a:lnB>
+                    <a:solidFill>
+                      <a:schemeClr val="bg1">
+                        <a:lumMod val="75000"/>
+                      </a:schemeClr>
+                    </a:solidFill>
+                  </a:tcPr>
+                </a:tc>
+              </a:tr>
+              <a:tr h="339440">
+                <a:tc>
+                  <a:txBody>
+                    <a:bodyPr/>
+                    <a:lstStyle/>
+                    <a:p>
+                      <a:pPr marL="0" marR="0" lvl="0" indent="0" algn="just" defTabSz="914400" rtl="0" eaLnBrk="1" fontAlgn="auto" latinLnBrk="1" hangingPunct="1">
+                        <a:lnSpc>
+                          <a:spcPct val="107000"/>
+                        </a:lnSpc>
+                        <a:spcBef>
+                          <a:spcPts val="0"/>
+                        </a:spcBef>
+                        <a:spcAft>
+                          <a:spcPts val="0"/>
+                        </a:spcAft>
+                        <a:buClrTx/>
+                        <a:buSzTx/>
+                        <a:buFontTx/>
+                        <a:buNone/>
+                        <a:tabLst/>
+                        <a:defRPr/>
+                      </a:pPr>
+                      <a:r>
+                        <a:rPr lang="en-US" altLang="ko-KR" sz="1200" b="0" kern="100" dirty="0" smtClean="0">
+                          <a:ln>
+                            <a:noFill/>
+                          </a:ln>
+                          <a:solidFill>
+                            <a:schemeClr val="tx1"/>
+                          </a:solidFill>
+                          <a:latin typeface="Verdana" panose="020B0604030504040204" pitchFamily="34" charset="0"/>
+                          <a:ea typeface="Verdana" panose="020B0604030504040204" pitchFamily="34" charset="0"/>
+                          <a:cs typeface="Times New Roman" panose="02020603050405020304" pitchFamily="18" charset="0"/>
+                        </a:rPr>
+                        <a:t>Captured face images (PII)</a:t>
+                      </a:r>
+                      <a:endParaRPr lang="ko-KR" altLang="ko-KR" sz="1200" b="0" kern="100" dirty="0" smtClean="0">
+                        <a:ln>
+                          <a:noFill/>
+                        </a:ln>
+                        <a:solidFill>
+                          <a:schemeClr val="tx1"/>
+                        </a:solidFill>
+                        <a:effectLst/>
+                        <a:latin typeface="Verdana" panose="020B0604030504040204" pitchFamily="34" charset="0"/>
+                        <a:ea typeface="Arial Unicode MS" panose="020B0604020202020204" pitchFamily="50" charset="-127"/>
+                        <a:cs typeface="Arial Unicode MS" panose="020B0604020202020204" pitchFamily="50" charset="-127"/>
+                      </a:endParaRPr>
+                    </a:p>
+                  </a:txBody>
+                  <a:tcPr marL="49969" marR="49969" marT="0" marB="0" anchor="ctr">
+                    <a:lnL w="12700" cap="flat" cmpd="sng" algn="ctr">
+                      <a:solidFill>
+                        <a:schemeClr val="tx1"/>
+                      </a:solidFill>
+                      <a:prstDash val="solid"/>
+                      <a:round/>
+                      <a:headEnd type="none" w="med" len="med"/>
+                      <a:tailEnd type="none" w="med" len="med"/>
+                    </a:lnL>
+                    <a:lnR w="12700" cap="flat" cmpd="sng" algn="ctr">
+                      <a:solidFill>
+                        <a:schemeClr val="tx1"/>
+                      </a:solidFill>
+                      <a:prstDash val="solid"/>
+                      <a:round/>
+                      <a:headEnd type="none" w="med" len="med"/>
+                      <a:tailEnd type="none" w="med" len="med"/>
+                    </a:lnR>
+                    <a:lnT w="12700" cap="flat" cmpd="sng" algn="ctr">
+                      <a:solidFill>
+                        <a:schemeClr val="tx1"/>
+                      </a:solidFill>
+                      <a:prstDash val="solid"/>
+                      <a:round/>
+                      <a:headEnd type="none" w="med" len="med"/>
+                      <a:tailEnd type="none" w="med" len="med"/>
+                    </a:lnT>
+                    <a:lnB w="12700" cap="flat" cmpd="sng" algn="ctr">
+                      <a:solidFill>
+                        <a:schemeClr val="tx1"/>
+                      </a:solidFill>
+                      <a:prstDash val="solid"/>
+                      <a:round/>
+                      <a:headEnd type="none" w="med" len="med"/>
+                      <a:tailEnd type="none" w="med" len="med"/>
+                    </a:lnB>
+                    <a:solidFill>
+                      <a:schemeClr val="bg1"/>
+                    </a:solidFill>
+                  </a:tcPr>
+                </a:tc>
+                <a:tc>
+                  <a:txBody>
+                    <a:bodyPr/>
+                    <a:lstStyle/>
+                    <a:p>
+                      <a:pPr marL="0" marR="0" lvl="0" indent="0" algn="just" defTabSz="914400" rtl="0" eaLnBrk="1" fontAlgn="auto" latinLnBrk="1" hangingPunct="1">
+                        <a:lnSpc>
+                          <a:spcPct val="107000"/>
+                        </a:lnSpc>
+                        <a:spcBef>
+                          <a:spcPts val="0"/>
+                        </a:spcBef>
+                        <a:spcAft>
+                          <a:spcPts val="0"/>
+                        </a:spcAft>
+                        <a:buClrTx/>
+                        <a:buSzTx/>
+                        <a:buFontTx/>
+                        <a:buNone/>
+                        <a:tabLst/>
+                        <a:defRPr/>
+                      </a:pPr>
+                      <a:r>
+                        <a:rPr lang="en-US" altLang="ko-KR" sz="1200" kern="100" dirty="0" smtClean="0">
+                          <a:ln>
+                            <a:noFill/>
+                          </a:ln>
+                          <a:solidFill>
+                            <a:schemeClr val="tx1"/>
+                          </a:solidFill>
+                          <a:effectLst/>
+                          <a:latin typeface="Verdana" panose="020B0604030504040204" pitchFamily="34" charset="0"/>
+                          <a:ea typeface="Verdana" panose="020B0604030504040204" pitchFamily="34" charset="0"/>
+                          <a:cs typeface="Arial Unicode MS" panose="020B0604020202020204" pitchFamily="50" charset="-127"/>
+                        </a:rPr>
+                        <a:t>Transmitted over the network</a:t>
+                      </a:r>
+                      <a:r>
+                        <a:rPr lang="en-US" altLang="ko-KR" sz="1200" kern="100" baseline="0" dirty="0" smtClean="0">
+                          <a:ln>
+                            <a:noFill/>
+                          </a:ln>
+                          <a:solidFill>
+                            <a:schemeClr val="tx1"/>
+                          </a:solidFill>
+                          <a:effectLst/>
+                          <a:latin typeface="Verdana" panose="020B0604030504040204" pitchFamily="34" charset="0"/>
+                          <a:ea typeface="Verdana" panose="020B0604030504040204" pitchFamily="34" charset="0"/>
+                          <a:cs typeface="Arial Unicode MS" panose="020B0604020202020204" pitchFamily="50" charset="-127"/>
+                        </a:rPr>
+                        <a:t> </a:t>
+                      </a:r>
+                      <a:r>
+                        <a:rPr lang="en-US" altLang="ko-KR" sz="1200" kern="100" dirty="0" smtClean="0">
+                          <a:ln>
+                            <a:noFill/>
+                          </a:ln>
+                          <a:solidFill>
+                            <a:schemeClr val="tx1"/>
+                          </a:solidFill>
+                          <a:effectLst/>
+                          <a:latin typeface="Verdana" panose="020B0604030504040204" pitchFamily="34" charset="0"/>
+                          <a:ea typeface="Arial Unicode MS" panose="020B0604020202020204" pitchFamily="50" charset="-127"/>
+                          <a:cs typeface="Arial Unicode MS" panose="020B0604020202020204" pitchFamily="50" charset="-127"/>
+                        </a:rPr>
+                        <a:t>,Stored in the server side storage</a:t>
+                      </a:r>
+                      <a:endParaRPr lang="ko-KR" sz="1200" kern="100" dirty="0">
+                        <a:ln>
+                          <a:noFill/>
+                        </a:ln>
+                        <a:solidFill>
+                          <a:schemeClr val="tx1"/>
+                        </a:solidFill>
+                        <a:effectLst/>
+                        <a:latin typeface="Verdana" panose="020B0604030504040204" pitchFamily="34" charset="0"/>
+                        <a:ea typeface="Arial Unicode MS" panose="020B0604020202020204" pitchFamily="50" charset="-127"/>
+                        <a:cs typeface="Arial Unicode MS" panose="020B0604020202020204" pitchFamily="50" charset="-127"/>
+                      </a:endParaRPr>
+                    </a:p>
+                  </a:txBody>
+                  <a:tcPr marL="49969" marR="49969" marT="0" marB="0" anchor="ctr">
+                    <a:lnL w="12700" cap="flat" cmpd="sng" algn="ctr">
+                      <a:solidFill>
+                        <a:schemeClr val="tx1"/>
+                      </a:solidFill>
+                      <a:prstDash val="solid"/>
+                      <a:round/>
+                      <a:headEnd type="none" w="med" len="med"/>
+                      <a:tailEnd type="none" w="med" len="med"/>
+                    </a:lnL>
+                    <a:lnR w="12700" cap="flat" cmpd="sng" algn="ctr">
+                      <a:solidFill>
+                        <a:schemeClr val="tx1"/>
+                      </a:solidFill>
+                      <a:prstDash val="solid"/>
+                      <a:round/>
+                      <a:headEnd type="none" w="med" len="med"/>
+                      <a:tailEnd type="none" w="med" len="med"/>
+                    </a:lnR>
+                    <a:lnT w="12700" cap="flat" cmpd="sng" algn="ctr">
+                      <a:solidFill>
+                        <a:schemeClr val="tx1"/>
+                      </a:solidFill>
+                      <a:prstDash val="solid"/>
+                      <a:round/>
+                      <a:headEnd type="none" w="med" len="med"/>
+                      <a:tailEnd type="none" w="med" len="med"/>
+                    </a:lnT>
+                    <a:lnB w="12700" cap="flat" cmpd="sng" algn="ctr">
+                      <a:solidFill>
+                        <a:schemeClr val="tx1"/>
+                      </a:solidFill>
+                      <a:prstDash val="solid"/>
+                      <a:round/>
+                      <a:headEnd type="none" w="med" len="med"/>
+                      <a:tailEnd type="none" w="med" len="med"/>
+                    </a:lnB>
+                    <a:solidFill>
+                      <a:schemeClr val="bg1"/>
+                    </a:solidFill>
+                  </a:tcPr>
+                </a:tc>
+              </a:tr>
+              <a:tr h="339440">
+                <a:tc>
+                  <a:txBody>
+                    <a:bodyPr/>
+                    <a:lstStyle/>
+                    <a:p>
+                      <a:pPr marL="0" marR="0" lvl="0" indent="0" algn="just" defTabSz="914400" rtl="0" eaLnBrk="1" fontAlgn="auto" latinLnBrk="1" hangingPunct="1">
+                        <a:lnSpc>
+                          <a:spcPct val="107000"/>
+                        </a:lnSpc>
+                        <a:spcBef>
+                          <a:spcPts val="0"/>
+                        </a:spcBef>
+                        <a:spcAft>
+                          <a:spcPts val="0"/>
+                        </a:spcAft>
+                        <a:buClrTx/>
+                        <a:buSzTx/>
+                        <a:buFontTx/>
+                        <a:buNone/>
+                        <a:tabLst/>
+                        <a:defRPr/>
+                      </a:pPr>
+                      <a:r>
+                        <a:rPr lang="en-US" altLang="ko-KR" sz="1200" b="0" kern="100" dirty="0" smtClean="0">
+                          <a:ln>
+                            <a:noFill/>
+                          </a:ln>
+                          <a:solidFill>
+                            <a:schemeClr val="tx1"/>
+                          </a:solidFill>
+                          <a:effectLst/>
+                          <a:latin typeface="Verdana" panose="020B0604030504040204" pitchFamily="34" charset="0"/>
+                          <a:ea typeface="Arial Unicode MS" panose="020B0604020202020204" pitchFamily="50" charset="-127"/>
+                          <a:cs typeface="Arial Unicode MS" panose="020B0604020202020204" pitchFamily="50" charset="-127"/>
+                        </a:rPr>
+                        <a:t>Added</a:t>
+                      </a:r>
+                      <a:r>
+                        <a:rPr lang="en-US" altLang="ko-KR" sz="1200" b="0" kern="100" baseline="0" dirty="0" smtClean="0">
+                          <a:ln>
+                            <a:noFill/>
+                          </a:ln>
+                          <a:solidFill>
+                            <a:schemeClr val="tx1"/>
+                          </a:solidFill>
+                          <a:effectLst/>
+                          <a:latin typeface="Verdana" panose="020B0604030504040204" pitchFamily="34" charset="0"/>
+                          <a:ea typeface="Arial Unicode MS" panose="020B0604020202020204" pitchFamily="50" charset="-127"/>
+                          <a:cs typeface="Arial Unicode MS" panose="020B0604020202020204" pitchFamily="50" charset="-127"/>
+                        </a:rPr>
+                        <a:t> face images (PII)</a:t>
+                      </a:r>
+                      <a:endParaRPr lang="ko-KR" altLang="ko-KR" sz="1200" b="0" kern="100" dirty="0" smtClean="0">
+                        <a:ln>
+                          <a:noFill/>
+                        </a:ln>
+                        <a:solidFill>
+                          <a:schemeClr val="tx1"/>
+                        </a:solidFill>
+                        <a:effectLst/>
+                        <a:latin typeface="Verdana" panose="020B0604030504040204" pitchFamily="34" charset="0"/>
+                        <a:ea typeface="Arial Unicode MS" panose="020B0604020202020204" pitchFamily="50" charset="-127"/>
+                        <a:cs typeface="Arial Unicode MS" panose="020B0604020202020204" pitchFamily="50" charset="-127"/>
+                      </a:endParaRPr>
+                    </a:p>
+                  </a:txBody>
+                  <a:tcPr marL="49969" marR="49969" marT="0" marB="0" anchor="ctr">
+                    <a:lnL w="12700" cap="flat" cmpd="sng" algn="ctr">
+                      <a:solidFill>
+                        <a:schemeClr val="tx1"/>
+                      </a:solidFill>
+                      <a:prstDash val="solid"/>
+                      <a:round/>
+                      <a:headEnd type="none" w="med" len="med"/>
+                      <a:tailEnd type="none" w="med" len="med"/>
+                    </a:lnL>
+                    <a:lnR w="12700" cap="flat" cmpd="sng" algn="ctr">
+                      <a:solidFill>
+                        <a:schemeClr val="tx1"/>
+                      </a:solidFill>
+                      <a:prstDash val="solid"/>
+                      <a:round/>
+                      <a:headEnd type="none" w="med" len="med"/>
+                      <a:tailEnd type="none" w="med" len="med"/>
+                    </a:lnR>
+                    <a:lnT w="12700" cap="flat" cmpd="sng" algn="ctr">
+                      <a:solidFill>
+                        <a:schemeClr val="tx1"/>
+                      </a:solidFill>
+                      <a:prstDash val="solid"/>
+                      <a:round/>
+                      <a:headEnd type="none" w="med" len="med"/>
+                      <a:tailEnd type="none" w="med" len="med"/>
+                    </a:lnT>
+                    <a:lnB w="12700" cap="flat" cmpd="sng" algn="ctr">
+                      <a:solidFill>
+                        <a:schemeClr val="tx1"/>
+                      </a:solidFill>
+                      <a:prstDash val="solid"/>
+                      <a:round/>
+                      <a:headEnd type="none" w="med" len="med"/>
+                      <a:tailEnd type="none" w="med" len="med"/>
+                    </a:lnB>
+                    <a:solidFill>
+                      <a:schemeClr val="bg1"/>
+                    </a:solidFill>
+                  </a:tcPr>
+                </a:tc>
+                <a:tc>
+                  <a:txBody>
+                    <a:bodyPr/>
+                    <a:lstStyle/>
+                    <a:p>
+                      <a:pPr marL="0" marR="0" lvl="0" indent="0" algn="just" defTabSz="914400" rtl="0" eaLnBrk="1" fontAlgn="auto" latinLnBrk="1" hangingPunct="1">
+                        <a:lnSpc>
+                          <a:spcPct val="107000"/>
+                        </a:lnSpc>
+                        <a:spcBef>
+                          <a:spcPts val="0"/>
+                        </a:spcBef>
+                        <a:spcAft>
+                          <a:spcPts val="0"/>
+                        </a:spcAft>
+                        <a:buClrTx/>
+                        <a:buSzTx/>
+                        <a:buFontTx/>
+                        <a:buNone/>
+                        <a:tabLst/>
+                        <a:defRPr/>
+                      </a:pPr>
+                      <a:r>
+                        <a:rPr lang="en-US" altLang="ko-KR" sz="1200" kern="100" dirty="0" smtClean="0">
+                          <a:ln>
+                            <a:noFill/>
+                          </a:ln>
+                          <a:solidFill>
+                            <a:schemeClr val="tx1"/>
+                          </a:solidFill>
+                          <a:effectLst/>
+                          <a:latin typeface="Verdana" panose="020B0604030504040204" pitchFamily="34" charset="0"/>
+                          <a:ea typeface="Arial Unicode MS" panose="020B0604020202020204" pitchFamily="50" charset="-127"/>
+                          <a:cs typeface="Arial Unicode MS" panose="020B0604020202020204" pitchFamily="50" charset="-127"/>
+                        </a:rPr>
+                        <a:t>Stored in the server side storage</a:t>
+                      </a:r>
+                      <a:endParaRPr lang="ko-KR" altLang="ko-KR" sz="1200" kern="100" smtClean="0">
+                        <a:ln>
+                          <a:noFill/>
+                        </a:ln>
+                        <a:solidFill>
+                          <a:schemeClr val="tx1"/>
+                        </a:solidFill>
+                        <a:effectLst/>
+                        <a:latin typeface="Verdana" panose="020B0604030504040204" pitchFamily="34" charset="0"/>
+                        <a:ea typeface="Arial Unicode MS" panose="020B0604020202020204" pitchFamily="50" charset="-127"/>
+                        <a:cs typeface="Arial Unicode MS" panose="020B0604020202020204" pitchFamily="50" charset="-127"/>
+                      </a:endParaRPr>
+                    </a:p>
+                  </a:txBody>
+                  <a:tcPr marL="49969" marR="49969" marT="0" marB="0" anchor="ctr">
+                    <a:lnL w="12700" cap="flat" cmpd="sng" algn="ctr">
+                      <a:solidFill>
+                        <a:schemeClr val="tx1"/>
+                      </a:solidFill>
+                      <a:prstDash val="solid"/>
+                      <a:round/>
+                      <a:headEnd type="none" w="med" len="med"/>
+                      <a:tailEnd type="none" w="med" len="med"/>
+                    </a:lnL>
+                    <a:lnR w="12700" cap="flat" cmpd="sng" algn="ctr">
+                      <a:solidFill>
+                        <a:schemeClr val="tx1"/>
+                      </a:solidFill>
+                      <a:prstDash val="solid"/>
+                      <a:round/>
+                      <a:headEnd type="none" w="med" len="med"/>
+                      <a:tailEnd type="none" w="med" len="med"/>
+                    </a:lnR>
+                    <a:lnT w="12700" cap="flat" cmpd="sng" algn="ctr">
+                      <a:solidFill>
+                        <a:schemeClr val="tx1"/>
+                      </a:solidFill>
+                      <a:prstDash val="solid"/>
+                      <a:round/>
+                      <a:headEnd type="none" w="med" len="med"/>
+                      <a:tailEnd type="none" w="med" len="med"/>
+                    </a:lnT>
+                    <a:lnB w="12700" cap="flat" cmpd="sng" algn="ctr">
+                      <a:solidFill>
+                        <a:schemeClr val="tx1"/>
+                      </a:solidFill>
+                      <a:prstDash val="solid"/>
+                      <a:round/>
+                      <a:headEnd type="none" w="med" len="med"/>
+                      <a:tailEnd type="none" w="med" len="med"/>
+                    </a:lnB>
+                    <a:solidFill>
+                      <a:schemeClr val="bg1"/>
+                    </a:solidFill>
+                  </a:tcPr>
+                </a:tc>
+              </a:tr>
+              <a:tr h="335568">
+                <a:tc>
+                  <a:txBody>
+                    <a:bodyPr/>
+                    <a:lstStyle/>
+                    <a:p>
+                      <a:pPr marL="0" marR="0" lvl="0" indent="0" algn="just" defTabSz="914400" rtl="0" eaLnBrk="1" fontAlgn="auto" latinLnBrk="1" hangingPunct="1">
+                        <a:lnSpc>
+                          <a:spcPct val="107000"/>
+                        </a:lnSpc>
+                        <a:spcBef>
+                          <a:spcPts val="0"/>
+                        </a:spcBef>
+                        <a:spcAft>
+                          <a:spcPts val="0"/>
+                        </a:spcAft>
+                        <a:buClrTx/>
+                        <a:buSzTx/>
+                        <a:buFontTx/>
+                        <a:buNone/>
+                        <a:tabLst/>
+                        <a:defRPr/>
+                      </a:pPr>
+                      <a:r>
+                        <a:rPr lang="en-US" altLang="ko-KR" sz="1200" b="0" kern="100" dirty="0" smtClean="0">
+                          <a:ln>
+                            <a:noFill/>
+                          </a:ln>
+                          <a:solidFill>
+                            <a:schemeClr val="tx1"/>
+                          </a:solidFill>
+                          <a:latin typeface="Verdana" panose="020B0604030504040204" pitchFamily="34" charset="0"/>
+                          <a:ea typeface="Verdana" panose="020B0604030504040204" pitchFamily="34" charset="0"/>
+                          <a:cs typeface="Times New Roman" panose="02020603050405020304" pitchFamily="18" charset="0"/>
+                        </a:rPr>
+                        <a:t>Image analyzed</a:t>
+                      </a:r>
+                      <a:r>
+                        <a:rPr lang="en-US" altLang="ko-KR" sz="1200" kern="100" dirty="0" smtClean="0">
+                          <a:ln>
+                            <a:noFill/>
+                          </a:ln>
+                          <a:solidFill>
+                            <a:schemeClr val="tx1"/>
+                          </a:solidFill>
+                          <a:latin typeface="Verdana" panose="020B0604030504040204" pitchFamily="34" charset="0"/>
+                          <a:ea typeface="Verdana" panose="020B0604030504040204" pitchFamily="34" charset="0"/>
+                          <a:cs typeface="Times New Roman" panose="02020603050405020304" pitchFamily="18" charset="0"/>
+                        </a:rPr>
+                        <a:t> </a:t>
+                      </a:r>
+                      <a:r>
+                        <a:rPr lang="en-US" altLang="ko-KR" sz="1200" b="0" kern="100" baseline="0" dirty="0" smtClean="0">
+                          <a:ln>
+                            <a:noFill/>
+                          </a:ln>
+                          <a:solidFill>
+                            <a:schemeClr val="tx1"/>
+                          </a:solidFill>
+                          <a:effectLst/>
+                          <a:latin typeface="Verdana" panose="020B0604030504040204" pitchFamily="34" charset="0"/>
+                          <a:ea typeface="Arial Unicode MS" panose="020B0604020202020204" pitchFamily="50" charset="-127"/>
+                          <a:cs typeface="Arial Unicode MS" panose="020B0604020202020204" pitchFamily="50" charset="-127"/>
+                        </a:rPr>
+                        <a:t>results (PII)</a:t>
+                      </a:r>
+                      <a:endParaRPr lang="ko-KR" altLang="ko-KR" sz="1200" b="0" kern="100" smtClean="0">
+                        <a:ln>
+                          <a:noFill/>
+                        </a:ln>
+                        <a:solidFill>
+                          <a:schemeClr val="tx1"/>
+                        </a:solidFill>
+                        <a:effectLst/>
+                        <a:latin typeface="Verdana" panose="020B0604030504040204" pitchFamily="34" charset="0"/>
+                        <a:ea typeface="Arial Unicode MS" panose="020B0604020202020204" pitchFamily="50" charset="-127"/>
+                        <a:cs typeface="Arial Unicode MS" panose="020B0604020202020204" pitchFamily="50" charset="-127"/>
+                      </a:endParaRPr>
+                    </a:p>
+                  </a:txBody>
+                  <a:tcPr marL="49969" marR="49969" marT="0" marB="0" anchor="ctr">
+                    <a:lnL w="12700" cap="flat" cmpd="sng" algn="ctr">
+                      <a:solidFill>
+                        <a:schemeClr val="tx1"/>
+                      </a:solidFill>
+                      <a:prstDash val="solid"/>
+                      <a:round/>
+                      <a:headEnd type="none" w="med" len="med"/>
+                      <a:tailEnd type="none" w="med" len="med"/>
+                    </a:lnL>
+                    <a:lnR w="12700" cap="flat" cmpd="sng" algn="ctr">
+                      <a:solidFill>
+                        <a:schemeClr val="tx1"/>
+                      </a:solidFill>
+                      <a:prstDash val="solid"/>
+                      <a:round/>
+                      <a:headEnd type="none" w="med" len="med"/>
+                      <a:tailEnd type="none" w="med" len="med"/>
+                    </a:lnR>
+                    <a:lnT w="12700" cap="flat" cmpd="sng" algn="ctr">
+                      <a:solidFill>
+                        <a:schemeClr val="tx1"/>
+                      </a:solidFill>
+                      <a:prstDash val="solid"/>
+                      <a:round/>
+                      <a:headEnd type="none" w="med" len="med"/>
+                      <a:tailEnd type="none" w="med" len="med"/>
+                    </a:lnT>
+                    <a:lnB w="12700" cap="flat" cmpd="sng" algn="ctr">
+                      <a:solidFill>
+                        <a:schemeClr val="tx1"/>
+                      </a:solidFill>
+                      <a:prstDash val="solid"/>
+                      <a:round/>
+                      <a:headEnd type="none" w="med" len="med"/>
+                      <a:tailEnd type="none" w="med" len="med"/>
+                    </a:lnB>
+                    <a:solidFill>
+                      <a:schemeClr val="bg1"/>
+                    </a:solidFill>
+                  </a:tcPr>
+                </a:tc>
+                <a:tc>
+                  <a:txBody>
+                    <a:bodyPr/>
+                    <a:lstStyle/>
+                    <a:p>
+                      <a:pPr algn="just" latinLnBrk="1">
+                        <a:lnSpc>
+                          <a:spcPct val="107000"/>
+                        </a:lnSpc>
+                        <a:spcAft>
+                          <a:spcPts val="0"/>
+                        </a:spcAft>
+                      </a:pPr>
+                      <a:r>
+                        <a:rPr lang="en-US" altLang="ko-KR" sz="1200" kern="100" dirty="0" smtClean="0">
+                          <a:ln>
+                            <a:noFill/>
+                          </a:ln>
+                          <a:solidFill>
+                            <a:schemeClr val="tx1"/>
+                          </a:solidFill>
+                          <a:effectLst/>
+                          <a:latin typeface="Verdana" panose="020B0604030504040204" pitchFamily="34" charset="0"/>
+                          <a:ea typeface="Verdana" panose="020B0604030504040204" pitchFamily="34" charset="0"/>
+                          <a:cs typeface="Arial Unicode MS" panose="020B0604020202020204" pitchFamily="50" charset="-127"/>
+                        </a:rPr>
+                        <a:t>Transmitted over the network</a:t>
+                      </a:r>
+                    </a:p>
+                  </a:txBody>
+                  <a:tcPr marL="49969" marR="49969" marT="0" marB="0" anchor="ctr">
+                    <a:lnL w="12700" cap="flat" cmpd="sng" algn="ctr">
+                      <a:solidFill>
+                        <a:schemeClr val="tx1"/>
+                      </a:solidFill>
+                      <a:prstDash val="solid"/>
+                      <a:round/>
+                      <a:headEnd type="none" w="med" len="med"/>
+                      <a:tailEnd type="none" w="med" len="med"/>
+                    </a:lnL>
+                    <a:lnR w="12700" cap="flat" cmpd="sng" algn="ctr">
+                      <a:solidFill>
+                        <a:schemeClr val="tx1"/>
+                      </a:solidFill>
+                      <a:prstDash val="solid"/>
+                      <a:round/>
+                      <a:headEnd type="none" w="med" len="med"/>
+                      <a:tailEnd type="none" w="med" len="med"/>
+                    </a:lnR>
+                    <a:lnT w="12700" cap="flat" cmpd="sng" algn="ctr">
+                      <a:solidFill>
+                        <a:schemeClr val="tx1"/>
+                      </a:solidFill>
+                      <a:prstDash val="solid"/>
+                      <a:round/>
+                      <a:headEnd type="none" w="med" len="med"/>
+                      <a:tailEnd type="none" w="med" len="med"/>
+                    </a:lnT>
+                    <a:lnB w="12700" cap="flat" cmpd="sng" algn="ctr">
+                      <a:solidFill>
+                        <a:schemeClr val="tx1"/>
+                      </a:solidFill>
+                      <a:prstDash val="solid"/>
+                      <a:round/>
+                      <a:headEnd type="none" w="med" len="med"/>
+                      <a:tailEnd type="none" w="med" len="med"/>
+                    </a:lnB>
+                    <a:solidFill>
+                      <a:schemeClr val="bg1"/>
+                    </a:solidFill>
+                  </a:tcPr>
+                </a:tc>
+              </a:tr>
+              <a:tr h="460369">
+                <a:tc>
+                  <a:txBody>
+                    <a:bodyPr/>
+                    <a:lstStyle/>
+                    <a:p>
+                      <a:pPr marL="0" marR="0" lvl="0" indent="0" algn="just" defTabSz="914400" rtl="0" eaLnBrk="1" fontAlgn="auto" latinLnBrk="1" hangingPunct="1">
+                        <a:lnSpc>
+                          <a:spcPct val="107000"/>
+                        </a:lnSpc>
+                        <a:spcBef>
+                          <a:spcPts val="0"/>
+                        </a:spcBef>
+                        <a:spcAft>
+                          <a:spcPts val="0"/>
+                        </a:spcAft>
+                        <a:buClrTx/>
+                        <a:buSzTx/>
+                        <a:buFontTx/>
+                        <a:buNone/>
+                        <a:tabLst/>
+                        <a:defRPr/>
+                      </a:pPr>
+                      <a:r>
+                        <a:rPr lang="en-US" altLang="ko-KR" sz="1200" b="0" kern="100" dirty="0" err="1" smtClean="0">
+                          <a:ln>
+                            <a:noFill/>
+                          </a:ln>
+                          <a:solidFill>
+                            <a:schemeClr val="tx1"/>
+                          </a:solidFill>
+                          <a:effectLst/>
+                          <a:latin typeface="Verdana" panose="020B0604030504040204" pitchFamily="34" charset="0"/>
+                          <a:ea typeface="Verdana" panose="020B0604030504040204" pitchFamily="34" charset="0"/>
+                          <a:cs typeface="Arial Unicode MS" panose="020B0604020202020204" pitchFamily="50" charset="-127"/>
+                        </a:rPr>
+                        <a:t>FaceNet</a:t>
+                      </a:r>
+                      <a:r>
+                        <a:rPr lang="en-US" altLang="ko-KR" sz="1200" b="0" kern="100" dirty="0" smtClean="0">
+                          <a:ln>
+                            <a:noFill/>
+                          </a:ln>
+                          <a:solidFill>
+                            <a:schemeClr val="tx1"/>
+                          </a:solidFill>
+                          <a:effectLst/>
+                          <a:latin typeface="Verdana" panose="020B0604030504040204" pitchFamily="34" charset="0"/>
+                          <a:ea typeface="Verdana" panose="020B0604030504040204" pitchFamily="34" charset="0"/>
+                          <a:cs typeface="Arial Unicode MS" panose="020B0604020202020204" pitchFamily="50" charset="-127"/>
+                        </a:rPr>
+                        <a:t> trained model files,</a:t>
+                      </a:r>
+                    </a:p>
+                    <a:p>
+                      <a:pPr marL="0" marR="0" lvl="0" indent="0" algn="just" defTabSz="914400" rtl="0" eaLnBrk="1" fontAlgn="auto" latinLnBrk="1" hangingPunct="1">
+                        <a:lnSpc>
+                          <a:spcPct val="107000"/>
+                        </a:lnSpc>
+                        <a:spcBef>
+                          <a:spcPts val="0"/>
+                        </a:spcBef>
+                        <a:spcAft>
+                          <a:spcPts val="0"/>
+                        </a:spcAft>
+                        <a:buClrTx/>
+                        <a:buSzTx/>
+                        <a:buFontTx/>
+                        <a:buNone/>
+                        <a:tabLst/>
+                        <a:defRPr/>
+                      </a:pPr>
+                      <a:r>
+                        <a:rPr lang="en-US" altLang="ko-KR" sz="1200" b="0" kern="100" dirty="0" smtClean="0">
+                          <a:ln>
+                            <a:noFill/>
+                          </a:ln>
+                          <a:solidFill>
+                            <a:schemeClr val="tx1"/>
+                          </a:solidFill>
+                          <a:effectLst/>
+                          <a:latin typeface="Verdana" panose="020B0604030504040204" pitchFamily="34" charset="0"/>
+                          <a:ea typeface="Verdana" panose="020B0604030504040204" pitchFamily="34" charset="0"/>
+                          <a:cs typeface="Arial Unicode MS" panose="020B0604020202020204" pitchFamily="50" charset="-127"/>
+                        </a:rPr>
+                        <a:t>CNN ( Convolutional Neural Network) trained model files</a:t>
+                      </a:r>
+                    </a:p>
+                  </a:txBody>
+                  <a:tcPr marL="49969" marR="49969" marT="0" marB="0" anchor="ctr">
+                    <a:lnL w="12700" cap="flat" cmpd="sng" algn="ctr">
+                      <a:solidFill>
+                        <a:schemeClr val="tx1"/>
+                      </a:solidFill>
+                      <a:prstDash val="solid"/>
+                      <a:round/>
+                      <a:headEnd type="none" w="med" len="med"/>
+                      <a:tailEnd type="none" w="med" len="med"/>
+                    </a:lnL>
+                    <a:lnR w="12700" cap="flat" cmpd="sng" algn="ctr">
+                      <a:solidFill>
+                        <a:schemeClr val="tx1"/>
+                      </a:solidFill>
+                      <a:prstDash val="solid"/>
+                      <a:round/>
+                      <a:headEnd type="none" w="med" len="med"/>
+                      <a:tailEnd type="none" w="med" len="med"/>
+                    </a:lnR>
+                    <a:lnT w="12700" cap="flat" cmpd="sng" algn="ctr">
+                      <a:solidFill>
+                        <a:schemeClr val="tx1"/>
+                      </a:solidFill>
+                      <a:prstDash val="solid"/>
+                      <a:round/>
+                      <a:headEnd type="none" w="med" len="med"/>
+                      <a:tailEnd type="none" w="med" len="med"/>
+                    </a:lnT>
+                    <a:lnB w="12700" cap="flat" cmpd="sng" algn="ctr">
+                      <a:solidFill>
+                        <a:schemeClr val="tx1"/>
+                      </a:solidFill>
+                      <a:prstDash val="solid"/>
+                      <a:round/>
+                      <a:headEnd type="none" w="med" len="med"/>
+                      <a:tailEnd type="none" w="med" len="med"/>
+                    </a:lnB>
+                    <a:solidFill>
+                      <a:schemeClr val="bg1"/>
+                    </a:solidFill>
+                  </a:tcPr>
+                </a:tc>
+                <a:tc>
+                  <a:txBody>
+                    <a:bodyPr/>
+                    <a:lstStyle/>
+                    <a:p>
+                      <a:pPr marL="0" marR="0" lvl="0" indent="0" algn="just" defTabSz="914400" rtl="0" eaLnBrk="1" fontAlgn="auto" latinLnBrk="1" hangingPunct="1">
+                        <a:lnSpc>
+                          <a:spcPct val="107000"/>
+                        </a:lnSpc>
+                        <a:spcBef>
+                          <a:spcPts val="0"/>
+                        </a:spcBef>
+                        <a:spcAft>
+                          <a:spcPts val="0"/>
+                        </a:spcAft>
+                        <a:buClrTx/>
+                        <a:buSzTx/>
+                        <a:buFontTx/>
+                        <a:buNone/>
+                        <a:tabLst/>
+                        <a:defRPr/>
+                      </a:pPr>
+                      <a:r>
+                        <a:rPr lang="en-US" altLang="ko-KR" sz="1200" kern="100" dirty="0" smtClean="0">
+                          <a:ln>
+                            <a:noFill/>
+                          </a:ln>
+                          <a:solidFill>
+                            <a:schemeClr val="tx1"/>
+                          </a:solidFill>
+                          <a:effectLst/>
+                          <a:latin typeface="Verdana" panose="020B0604030504040204" pitchFamily="34" charset="0"/>
+                          <a:ea typeface="Arial Unicode MS" panose="020B0604020202020204" pitchFamily="50" charset="-127"/>
+                          <a:cs typeface="Arial Unicode MS" panose="020B0604020202020204" pitchFamily="50" charset="-127"/>
+                        </a:rPr>
+                        <a:t>Stored in the server side storage</a:t>
+                      </a:r>
+                      <a:endParaRPr lang="ko-KR" altLang="ko-KR" sz="1200" kern="100" smtClean="0">
+                        <a:ln>
+                          <a:noFill/>
+                        </a:ln>
+                        <a:solidFill>
+                          <a:schemeClr val="tx1"/>
+                        </a:solidFill>
+                        <a:effectLst/>
+                        <a:latin typeface="Verdana" panose="020B0604030504040204" pitchFamily="34" charset="0"/>
+                        <a:ea typeface="Arial Unicode MS" panose="020B0604020202020204" pitchFamily="50" charset="-127"/>
+                        <a:cs typeface="Arial Unicode MS" panose="020B0604020202020204" pitchFamily="50" charset="-127"/>
+                      </a:endParaRPr>
+                    </a:p>
+                  </a:txBody>
+                  <a:tcPr marL="49969" marR="49969" marT="0" marB="0" anchor="ctr">
+                    <a:lnL w="12700" cap="flat" cmpd="sng" algn="ctr">
+                      <a:solidFill>
+                        <a:schemeClr val="tx1"/>
+                      </a:solidFill>
+                      <a:prstDash val="solid"/>
+                      <a:round/>
+                      <a:headEnd type="none" w="med" len="med"/>
+                      <a:tailEnd type="none" w="med" len="med"/>
+                    </a:lnL>
+                    <a:lnR w="12700" cap="flat" cmpd="sng" algn="ctr">
+                      <a:solidFill>
+                        <a:schemeClr val="tx1"/>
+                      </a:solidFill>
+                      <a:prstDash val="solid"/>
+                      <a:round/>
+                      <a:headEnd type="none" w="med" len="med"/>
+                      <a:tailEnd type="none" w="med" len="med"/>
+                    </a:lnR>
+                    <a:lnT w="12700" cap="flat" cmpd="sng" algn="ctr">
+                      <a:solidFill>
+                        <a:schemeClr val="tx1"/>
+                      </a:solidFill>
+                      <a:prstDash val="solid"/>
+                      <a:round/>
+                      <a:headEnd type="none" w="med" len="med"/>
+                      <a:tailEnd type="none" w="med" len="med"/>
+                    </a:lnT>
+                    <a:lnB w="12700" cap="flat" cmpd="sng" algn="ctr">
+                      <a:solidFill>
+                        <a:schemeClr val="tx1"/>
+                      </a:solidFill>
+                      <a:prstDash val="solid"/>
+                      <a:round/>
+                      <a:headEnd type="none" w="med" len="med"/>
+                      <a:tailEnd type="none" w="med" len="med"/>
+                    </a:lnB>
+                    <a:solidFill>
+                      <a:schemeClr val="bg1"/>
+                    </a:solidFill>
+                  </a:tcPr>
+                </a:tc>
+              </a:tr>
+              <a:tr h="434013">
+                <a:tc>
+                  <a:txBody>
+                    <a:bodyPr/>
+                    <a:lstStyle/>
+                    <a:p>
+                      <a:pPr algn="just" latinLnBrk="1">
+                        <a:lnSpc>
+                          <a:spcPct val="107000"/>
+                        </a:lnSpc>
+                        <a:spcAft>
+                          <a:spcPts val="0"/>
+                        </a:spcAft>
+                      </a:pPr>
+                      <a:r>
+                        <a:rPr lang="en-US" altLang="ko-KR" sz="1200" b="0" kern="100" dirty="0" smtClean="0">
+                          <a:ln>
+                            <a:noFill/>
+                          </a:ln>
+                          <a:solidFill>
+                            <a:schemeClr val="tx1"/>
+                          </a:solidFill>
+                          <a:effectLst/>
+                          <a:latin typeface="Verdana" panose="020B0604030504040204" pitchFamily="34" charset="0"/>
+                          <a:ea typeface="Arial Unicode MS" panose="020B0604020202020204" pitchFamily="50" charset="-127"/>
+                          <a:cs typeface="Arial Unicode MS" panose="020B0604020202020204" pitchFamily="50" charset="-127"/>
+                        </a:rPr>
+                        <a:t>User</a:t>
+                      </a:r>
+                      <a:r>
+                        <a:rPr lang="en-US" altLang="ko-KR" sz="1200" b="0" kern="100" baseline="0" dirty="0" smtClean="0">
+                          <a:ln>
+                            <a:noFill/>
+                          </a:ln>
+                          <a:solidFill>
+                            <a:schemeClr val="tx1"/>
+                          </a:solidFill>
+                          <a:effectLst/>
+                          <a:latin typeface="Verdana" panose="020B0604030504040204" pitchFamily="34" charset="0"/>
+                          <a:ea typeface="Arial Unicode MS" panose="020B0604020202020204" pitchFamily="50" charset="-127"/>
+                          <a:cs typeface="Arial Unicode MS" panose="020B0604020202020204" pitchFamily="50" charset="-127"/>
+                        </a:rPr>
+                        <a:t> credential</a:t>
+                      </a:r>
+                      <a:endParaRPr lang="ko-KR" sz="1200" b="0" kern="100" dirty="0">
+                        <a:ln>
+                          <a:noFill/>
+                        </a:ln>
+                        <a:solidFill>
+                          <a:schemeClr val="tx1"/>
+                        </a:solidFill>
+                        <a:effectLst/>
+                        <a:latin typeface="Verdana" panose="020B0604030504040204" pitchFamily="34" charset="0"/>
+                        <a:ea typeface="Arial Unicode MS" panose="020B0604020202020204" pitchFamily="50" charset="-127"/>
+                        <a:cs typeface="Arial Unicode MS" panose="020B0604020202020204" pitchFamily="50" charset="-127"/>
+                      </a:endParaRPr>
+                    </a:p>
+                  </a:txBody>
+                  <a:tcPr marL="49969" marR="49969" marT="0" marB="0" anchor="ctr">
+                    <a:lnL w="12700" cap="flat" cmpd="sng" algn="ctr">
+                      <a:solidFill>
+                        <a:schemeClr val="tx1"/>
+                      </a:solidFill>
+                      <a:prstDash val="solid"/>
+                      <a:round/>
+                      <a:headEnd type="none" w="med" len="med"/>
+                      <a:tailEnd type="none" w="med" len="med"/>
+                    </a:lnL>
+                    <a:lnR w="12700" cap="flat" cmpd="sng" algn="ctr">
+                      <a:solidFill>
+                        <a:schemeClr val="tx1"/>
+                      </a:solidFill>
+                      <a:prstDash val="solid"/>
+                      <a:round/>
+                      <a:headEnd type="none" w="med" len="med"/>
+                      <a:tailEnd type="none" w="med" len="med"/>
+                    </a:lnR>
+                    <a:lnT w="12700" cap="flat" cmpd="sng" algn="ctr">
+                      <a:solidFill>
+                        <a:schemeClr val="tx1"/>
+                      </a:solidFill>
+                      <a:prstDash val="solid"/>
+                      <a:round/>
+                      <a:headEnd type="none" w="med" len="med"/>
+                      <a:tailEnd type="none" w="med" len="med"/>
+                    </a:lnT>
+                    <a:lnB w="12700" cap="flat" cmpd="sng" algn="ctr">
+                      <a:solidFill>
+                        <a:schemeClr val="tx1"/>
+                      </a:solidFill>
+                      <a:prstDash val="solid"/>
+                      <a:round/>
+                      <a:headEnd type="none" w="med" len="med"/>
+                      <a:tailEnd type="none" w="med" len="med"/>
+                    </a:lnB>
+                    <a:solidFill>
+                      <a:schemeClr val="bg1"/>
+                    </a:solidFill>
+                  </a:tcPr>
+                </a:tc>
+                <a:tc>
+                  <a:txBody>
+                    <a:bodyPr/>
+                    <a:lstStyle/>
+                    <a:p>
+                      <a:pPr marL="0" marR="0" lvl="0" indent="0" algn="just" defTabSz="914400" rtl="0" eaLnBrk="1" fontAlgn="auto" latinLnBrk="1" hangingPunct="1">
+                        <a:lnSpc>
+                          <a:spcPct val="107000"/>
+                        </a:lnSpc>
+                        <a:spcBef>
+                          <a:spcPts val="0"/>
+                        </a:spcBef>
+                        <a:spcAft>
+                          <a:spcPts val="0"/>
+                        </a:spcAft>
+                        <a:buClrTx/>
+                        <a:buSzTx/>
+                        <a:buFontTx/>
+                        <a:buNone/>
+                        <a:tabLst/>
+                        <a:defRPr/>
+                      </a:pPr>
+                      <a:r>
+                        <a:rPr lang="en-US" altLang="ko-KR" sz="1200" kern="100" dirty="0" smtClean="0">
+                          <a:ln>
+                            <a:noFill/>
+                          </a:ln>
+                          <a:solidFill>
+                            <a:schemeClr val="tx1"/>
+                          </a:solidFill>
+                          <a:effectLst/>
+                          <a:latin typeface="Verdana" panose="020B0604030504040204" pitchFamily="34" charset="0"/>
+                          <a:ea typeface="Verdana" panose="020B0604030504040204" pitchFamily="34" charset="0"/>
+                          <a:cs typeface="Arial Unicode MS" panose="020B0604020202020204" pitchFamily="50" charset="-127"/>
+                        </a:rPr>
+                        <a:t>Transmitted over the network</a:t>
+                      </a:r>
+                      <a:r>
+                        <a:rPr lang="en-US" altLang="ko-KR" sz="1200" kern="100" baseline="0" dirty="0" smtClean="0">
+                          <a:ln>
+                            <a:noFill/>
+                          </a:ln>
+                          <a:solidFill>
+                            <a:schemeClr val="tx1"/>
+                          </a:solidFill>
+                          <a:effectLst/>
+                          <a:latin typeface="Verdana" panose="020B0604030504040204" pitchFamily="34" charset="0"/>
+                          <a:ea typeface="Verdana" panose="020B0604030504040204" pitchFamily="34" charset="0"/>
+                          <a:cs typeface="Arial Unicode MS" panose="020B0604020202020204" pitchFamily="50" charset="-127"/>
+                        </a:rPr>
+                        <a:t> </a:t>
+                      </a:r>
+                      <a:r>
+                        <a:rPr lang="en-US" altLang="ko-KR" sz="1200" kern="100" dirty="0" smtClean="0">
+                          <a:ln>
+                            <a:noFill/>
+                          </a:ln>
+                          <a:solidFill>
+                            <a:schemeClr val="tx1"/>
+                          </a:solidFill>
+                          <a:effectLst/>
+                          <a:latin typeface="Verdana" panose="020B0604030504040204" pitchFamily="34" charset="0"/>
+                          <a:ea typeface="Arial Unicode MS" panose="020B0604020202020204" pitchFamily="50" charset="-127"/>
+                          <a:cs typeface="Arial Unicode MS" panose="020B0604020202020204" pitchFamily="50" charset="-127"/>
+                        </a:rPr>
+                        <a:t>,Stored in the server side storage</a:t>
+                      </a:r>
+                      <a:endParaRPr lang="ko-KR" altLang="ko-KR" sz="1200" kern="100" smtClean="0">
+                        <a:ln>
+                          <a:noFill/>
+                        </a:ln>
+                        <a:solidFill>
+                          <a:schemeClr val="tx1"/>
+                        </a:solidFill>
+                        <a:effectLst/>
+                        <a:latin typeface="Verdana" panose="020B0604030504040204" pitchFamily="34" charset="0"/>
+                        <a:ea typeface="Arial Unicode MS" panose="020B0604020202020204" pitchFamily="50" charset="-127"/>
+                        <a:cs typeface="Arial Unicode MS" panose="020B0604020202020204" pitchFamily="50" charset="-127"/>
+                      </a:endParaRPr>
+                    </a:p>
+                  </a:txBody>
+                  <a:tcPr marL="49969" marR="49969" marT="0" marB="0" anchor="ctr">
+                    <a:lnL w="12700" cap="flat" cmpd="sng" algn="ctr">
+                      <a:solidFill>
+                        <a:schemeClr val="tx1"/>
+                      </a:solidFill>
+                      <a:prstDash val="solid"/>
+                      <a:round/>
+                      <a:headEnd type="none" w="med" len="med"/>
+                      <a:tailEnd type="none" w="med" len="med"/>
+                    </a:lnL>
+                    <a:lnR w="12700" cap="flat" cmpd="sng" algn="ctr">
+                      <a:solidFill>
+                        <a:schemeClr val="tx1"/>
+                      </a:solidFill>
+                      <a:prstDash val="solid"/>
+                      <a:round/>
+                      <a:headEnd type="none" w="med" len="med"/>
+                      <a:tailEnd type="none" w="med" len="med"/>
+                    </a:lnR>
+                    <a:lnT w="12700" cap="flat" cmpd="sng" algn="ctr">
+                      <a:solidFill>
+                        <a:schemeClr val="tx1"/>
+                      </a:solidFill>
+                      <a:prstDash val="solid"/>
+                      <a:round/>
+                      <a:headEnd type="none" w="med" len="med"/>
+                      <a:tailEnd type="none" w="med" len="med"/>
+                    </a:lnT>
+                    <a:lnB w="12700" cap="flat" cmpd="sng" algn="ctr">
+                      <a:solidFill>
+                        <a:schemeClr val="tx1"/>
+                      </a:solidFill>
+                      <a:prstDash val="solid"/>
+                      <a:round/>
+                      <a:headEnd type="none" w="med" len="med"/>
+                      <a:tailEnd type="none" w="med" len="med"/>
+                    </a:lnB>
+                    <a:solidFill>
+                      <a:schemeClr val="bg1"/>
+                    </a:solidFill>
+                  </a:tcPr>
+                </a:tc>
+              </a:tr>
+            </a:tbl>
+          </a:graphicData>
+        </a:graphic>
+      </p:graphicFrame>
+      <p:sp>
+        <p:nvSpPr>
+          <p:cNvPr id="6" name="제목 1"/>
+          <p:cNvSpPr txBox="1">
+            <a:spLocks/>
+          </p:cNvSpPr>
+          <p:nvPr/>
+        </p:nvSpPr>
+        <p:spPr>
+          <a:xfrm>
+            <a:off x="581462" y="233916"/>
+            <a:ext cx="10515600" cy="829340"/>
+          </a:xfrm>
+          <a:prstGeom prst="rect">
+            <a:avLst/>
+          </a:prstGeom>
+        </p:spPr>
+        <p:txBody>
+          <a:bodyPr vert="horz" lIns="91440" tIns="45720" rIns="91440" bIns="45720" rtlCol="0" anchor="ctr">
+            <a:normAutofit/>
+          </a:bodyPr>
+          <a:lstStyle>
+            <a:lvl1pPr algn="l" defTabSz="914400" rtl="0" eaLnBrk="1" latinLnBrk="1" hangingPunct="1">
+              <a:lnSpc>
+                <a:spcPct val="90000"/>
+              </a:lnSpc>
+              <a:spcBef>
+                <a:spcPct val="0"/>
+              </a:spcBef>
+              <a:buNone/>
+              <a:defRPr sz="4400" kern="1200">
+                <a:solidFill>
+                  <a:schemeClr val="tx1"/>
+                </a:solidFill>
+                <a:latin typeface="+mj-lt"/>
+                <a:ea typeface="+mj-ea"/>
+                <a:cs typeface="+mj-cs"/>
+              </a:defRPr>
+            </a:lvl1pPr>
+          </a:lstStyle>
+          <a:p>
+            <a:r>
+              <a:rPr lang="en-US" altLang="ko-KR" sz="2000" b="1" dirty="0">
+                <a:latin typeface="Verdana" panose="020B0604030504040204" pitchFamily="34" charset="0"/>
+                <a:ea typeface="Verdana" panose="020B0604030504040204" pitchFamily="34" charset="0"/>
+              </a:rPr>
+              <a:t>Security </a:t>
+            </a:r>
+            <a:r>
+              <a:rPr lang="en-US" altLang="ko-KR" sz="2000" b="1" dirty="0" smtClean="0">
+                <a:latin typeface="Verdana" panose="020B0604030504040204" pitchFamily="34" charset="0"/>
+                <a:ea typeface="Verdana" panose="020B0604030504040204" pitchFamily="34" charset="0"/>
+              </a:rPr>
+              <a:t>Requirements (</a:t>
+            </a:r>
+            <a:r>
+              <a:rPr lang="en-US" altLang="ko-KR" sz="2000" b="1" dirty="0">
+                <a:latin typeface="Verdana" panose="020B0604030504040204" pitchFamily="34" charset="0"/>
+                <a:ea typeface="Verdana" panose="020B0604030504040204" pitchFamily="34" charset="0"/>
+              </a:rPr>
+              <a:t>SQUARE-Lite)</a:t>
+            </a:r>
+            <a:endParaRPr lang="ko-KR" altLang="en-US" sz="2000" b="1" dirty="0">
+              <a:latin typeface="Verdana" panose="020B0604030504040204" pitchFamily="34" charset="0"/>
+            </a:endParaRPr>
+          </a:p>
+        </p:txBody>
+      </p:sp>
+    </p:spTree>
+    <p:extLst>
+      <p:ext uri="{BB962C8B-B14F-4D97-AF65-F5344CB8AC3E}">
+        <p14:creationId xmlns:p14="http://schemas.microsoft.com/office/powerpoint/2010/main" val="3340541345"/>
+      </p:ext>
+    </p:extLst>
+  </p:cSld>
+  <p:clrMapOvr>
+    <a:masterClrMapping/>
+  </p:clrMapOvr>
+  <p:timing>
+    <p:tnLst>
+      <p:par>
+        <p:cTn id="1" dur="indefinite" restart="never" nodeType="tmRoot"/>
+      </p:par>
+    </p:tnLst>
+  </p:timing>
+</p:sld>
+</file>
+
+<file path=ppt/slides/slide3.xml><?xml version="1.0" encoding="utf-8"?>
 <p:sld xmlns:a="http://schemas.openxmlformats.org/drawingml/2006/main" xmlns:r="http://schemas.openxmlformats.org/officeDocument/2006/relationships" xmlns:p="http://schemas.openxmlformats.org/presentationml/2006/main">
   <p:cSld>
     <p:spTree>
@@ -4461,7 +7465,7 @@
           <a:graphicData uri="http://schemas.openxmlformats.org/presentationml/2006/ole">
             <mc:AlternateContent xmlns:mc="http://schemas.openxmlformats.org/markup-compatibility/2006">
               <mc:Choice xmlns:v="urn:schemas-microsoft-com:vml" Requires="v">
-                <p:oleObj spid="_x0000_s3132" name="워크시트" showAsIcon="1" r:id="rId4" imgW="914400" imgH="771480" progId="Excel.Sheet.8">
+                <p:oleObj spid="_x0000_s3136" name="워크시트" showAsIcon="1" r:id="rId4" imgW="914400" imgH="771480" progId="Excel.Sheet.8">
                   <p:embed/>
                 </p:oleObj>
               </mc:Choice>
@@ -4934,7 +7938,7 @@
 </p:sld>
 </file>
 
-<file path=ppt/slides/slide3.xml><?xml version="1.0" encoding="utf-8"?>
+<file path=ppt/slides/slide4.xml><?xml version="1.0" encoding="utf-8"?>
 <p:sld xmlns:a="http://schemas.openxmlformats.org/drawingml/2006/main" xmlns:r="http://schemas.openxmlformats.org/officeDocument/2006/relationships" xmlns:p="http://schemas.openxmlformats.org/presentationml/2006/main">
   <p:cSld>
     <p:spTree>
@@ -6762,7 +9766,7 @@
 </p:sld>
 </file>
 
-<file path=ppt/slides/slide4.xml><?xml version="1.0" encoding="utf-8"?>
+<file path=ppt/slides/slide5.xml><?xml version="1.0" encoding="utf-8"?>
 <p:sld xmlns:a="http://schemas.openxmlformats.org/drawingml/2006/main" xmlns:r="http://schemas.openxmlformats.org/officeDocument/2006/relationships" xmlns:p="http://schemas.openxmlformats.org/presentationml/2006/main">
   <p:cSld>
     <p:spTree>
@@ -11663,7 +14667,7 @@
 </p:sld>
 </file>
 
-<file path=ppt/slides/slide5.xml><?xml version="1.0" encoding="utf-8"?>
+<file path=ppt/slides/slide6.xml><?xml version="1.0" encoding="utf-8"?>
 <p:sld xmlns:a="http://schemas.openxmlformats.org/drawingml/2006/main" xmlns:r="http://schemas.openxmlformats.org/officeDocument/2006/relationships" xmlns:p="http://schemas.openxmlformats.org/presentationml/2006/main">
   <p:cSld>
     <p:spTree>
@@ -15159,7 +18163,7 @@
 </p:sld>
 </file>
 
-<file path=ppt/slides/slide6.xml><?xml version="1.0" encoding="utf-8"?>
+<file path=ppt/slides/slide7.xml><?xml version="1.0" encoding="utf-8"?>
 <p:sld xmlns:a="http://schemas.openxmlformats.org/drawingml/2006/main" xmlns:r="http://schemas.openxmlformats.org/officeDocument/2006/relationships" xmlns:p="http://schemas.openxmlformats.org/presentationml/2006/main">
   <p:cSld>
     <p:spTree>
@@ -16576,7 +19580,7 @@
 </p:sld>
 </file>
 
-<file path=ppt/slides/slide7.xml><?xml version="1.0" encoding="utf-8"?>
+<file path=ppt/slides/slide8.xml><?xml version="1.0" encoding="utf-8"?>
 <p:sld xmlns:a="http://schemas.openxmlformats.org/drawingml/2006/main" xmlns:r="http://schemas.openxmlformats.org/officeDocument/2006/relationships" xmlns:p="http://schemas.openxmlformats.org/presentationml/2006/main">
   <p:cSld>
     <p:spTree>
@@ -19618,7 +22622,7 @@
 </p:sld>
 </file>
 
-<file path=ppt/slides/slide8.xml><?xml version="1.0" encoding="utf-8"?>
+<file path=ppt/slides/slide9.xml><?xml version="1.0" encoding="utf-8"?>
 <p:sld xmlns:a="http://schemas.openxmlformats.org/drawingml/2006/main" xmlns:r="http://schemas.openxmlformats.org/officeDocument/2006/relationships" xmlns:p="http://schemas.openxmlformats.org/presentationml/2006/main">
   <p:cSld>
     <p:spTree>
@@ -20647,358 +23651,6 @@
 </p:sld>
 </file>
 
-<file path=ppt/slides/slide9.xml><?xml version="1.0" encoding="utf-8"?>
-<p:sld xmlns:a="http://schemas.openxmlformats.org/drawingml/2006/main" xmlns:r="http://schemas.openxmlformats.org/officeDocument/2006/relationships" xmlns:p="http://schemas.openxmlformats.org/presentationml/2006/main">
-  <p:cSld>
-    <p:spTree>
-      <p:nvGrpSpPr>
-        <p:cNvPr id="1" name="Shape 93"/>
-        <p:cNvGrpSpPr/>
-        <p:nvPr/>
-      </p:nvGrpSpPr>
-      <p:grpSpPr>
-        <a:xfrm>
-          <a:off x="0" y="0"/>
-          <a:ext cx="0" cy="0"/>
-          <a:chOff x="0" y="0"/>
-          <a:chExt cx="0" cy="0"/>
-        </a:xfrm>
-      </p:grpSpPr>
-      <p:sp>
-        <p:nvSpPr>
-          <p:cNvPr id="5" name="제목 1"/>
-          <p:cNvSpPr txBox="1">
-            <a:spLocks/>
-          </p:cNvSpPr>
-          <p:nvPr/>
-        </p:nvSpPr>
-        <p:spPr>
-          <a:xfrm>
-            <a:off x="544052" y="312306"/>
-            <a:ext cx="10515600" cy="829340"/>
-          </a:xfrm>
-          <a:prstGeom prst="rect">
-            <a:avLst/>
-          </a:prstGeom>
-        </p:spPr>
-        <p:txBody>
-          <a:bodyPr>
-            <a:normAutofit/>
-          </a:bodyPr>
-          <a:lstStyle>
-            <a:lvl1pPr algn="l" defTabSz="914400" rtl="0" eaLnBrk="1" latinLnBrk="1" hangingPunct="1">
-              <a:lnSpc>
-                <a:spcPct val="90000"/>
-              </a:lnSpc>
-              <a:spcBef>
-                <a:spcPct val="0"/>
-              </a:spcBef>
-              <a:buNone/>
-              <a:defRPr sz="4400" kern="1200">
-                <a:solidFill>
-                  <a:schemeClr val="tx1"/>
-                </a:solidFill>
-                <a:latin typeface="+mj-lt"/>
-                <a:ea typeface="+mj-ea"/>
-                <a:cs typeface="+mj-cs"/>
-              </a:defRPr>
-            </a:lvl1pPr>
-          </a:lstStyle>
-          <a:p>
-            <a:r>
-              <a:rPr lang="en-US" altLang="ko-KR" sz="2000" b="1" dirty="0" smtClean="0">
-                <a:latin typeface="Verdana" panose="020B0604030504040204" pitchFamily="34" charset="0"/>
-                <a:ea typeface="Verdana" panose="020B0604030504040204" pitchFamily="34" charset="0"/>
-              </a:rPr>
-              <a:t>Learning Mode</a:t>
-            </a:r>
-            <a:endParaRPr lang="ko-KR" altLang="en-US" sz="2000" b="1" dirty="0">
-              <a:latin typeface="Verdana" panose="020B0604030504040204" pitchFamily="34" charset="0"/>
-            </a:endParaRPr>
-          </a:p>
-        </p:txBody>
-      </p:sp>
-      <p:pic>
-        <p:nvPicPr>
-          <p:cNvPr id="12" name="그림 11"/>
-          <p:cNvPicPr>
-            <a:picLocks noChangeAspect="1"/>
-          </p:cNvPicPr>
-          <p:nvPr/>
-        </p:nvPicPr>
-        <p:blipFill>
-          <a:blip r:embed="rId3"/>
-          <a:stretch>
-            <a:fillRect/>
-          </a:stretch>
-        </p:blipFill>
-        <p:spPr>
-          <a:xfrm>
-            <a:off x="198407" y="1274969"/>
-            <a:ext cx="5895975" cy="4276725"/>
-          </a:xfrm>
-          <a:prstGeom prst="rect">
-            <a:avLst/>
-          </a:prstGeom>
-        </p:spPr>
-      </p:pic>
-      <p:pic>
-        <p:nvPicPr>
-          <p:cNvPr id="13" name="그림 12"/>
-          <p:cNvPicPr>
-            <a:picLocks noChangeAspect="1"/>
-          </p:cNvPicPr>
-          <p:nvPr/>
-        </p:nvPicPr>
-        <p:blipFill>
-          <a:blip r:embed="rId4"/>
-          <a:stretch>
-            <a:fillRect/>
-          </a:stretch>
-        </p:blipFill>
-        <p:spPr>
-          <a:xfrm>
-            <a:off x="5957887" y="2273401"/>
-            <a:ext cx="6010275" cy="4362450"/>
-          </a:xfrm>
-          <a:prstGeom prst="rect">
-            <a:avLst/>
-          </a:prstGeom>
-        </p:spPr>
-      </p:pic>
-      <p:sp>
-        <p:nvSpPr>
-          <p:cNvPr id="8" name="모서리가 둥근 사각형 설명선 7"/>
-          <p:cNvSpPr/>
-          <p:nvPr/>
-        </p:nvSpPr>
-        <p:spPr>
-          <a:xfrm>
-            <a:off x="10286999" y="5248276"/>
-            <a:ext cx="1763518" cy="561975"/>
-          </a:xfrm>
-          <a:prstGeom prst="wedgeRoundRectCallout">
-            <a:avLst>
-              <a:gd name="adj1" fmla="val 26651"/>
-              <a:gd name="adj2" fmla="val -158786"/>
-              <a:gd name="adj3" fmla="val 16667"/>
-            </a:avLst>
-          </a:prstGeom>
-          <a:solidFill>
-            <a:schemeClr val="accent2">
-              <a:lumMod val="20000"/>
-              <a:lumOff val="80000"/>
-            </a:schemeClr>
-          </a:solidFill>
-          <a:ln w="9525">
-            <a:solidFill>
-              <a:schemeClr val="tx1"/>
-            </a:solidFill>
-            <a:prstDash val="solid"/>
-          </a:ln>
-        </p:spPr>
-        <p:style>
-          <a:lnRef idx="2">
-            <a:schemeClr val="accent1">
-              <a:shade val="50000"/>
-            </a:schemeClr>
-          </a:lnRef>
-          <a:fillRef idx="1">
-            <a:schemeClr val="accent1"/>
-          </a:fillRef>
-          <a:effectRef idx="0">
-            <a:schemeClr val="accent1"/>
-          </a:effectRef>
-          <a:fontRef idx="minor">
-            <a:schemeClr val="lt1"/>
-          </a:fontRef>
-        </p:style>
-        <p:txBody>
-          <a:bodyPr rtlCol="0" anchor="ctr"/>
-          <a:lstStyle/>
-          <a:p>
-            <a:pPr algn="ctr"/>
-            <a:r>
-              <a:rPr lang="en-US" altLang="ko-KR" sz="900" dirty="0" smtClean="0">
-                <a:solidFill>
-                  <a:schemeClr val="tx1"/>
-                </a:solidFill>
-                <a:latin typeface="Verdana" panose="020B0604030504040204" pitchFamily="34" charset="0"/>
-                <a:ea typeface="Verdana" panose="020B0604030504040204" pitchFamily="34" charset="0"/>
-              </a:rPr>
-              <a:t>3) Select confirm to add the image</a:t>
-            </a:r>
-            <a:endParaRPr lang="ko-KR" altLang="en-US" sz="900">
-              <a:solidFill>
-                <a:schemeClr val="tx1"/>
-              </a:solidFill>
-              <a:latin typeface="Verdana" panose="020B0604030504040204" pitchFamily="34" charset="0"/>
-            </a:endParaRPr>
-          </a:p>
-        </p:txBody>
-      </p:sp>
-      <p:sp>
-        <p:nvSpPr>
-          <p:cNvPr id="7" name="모서리가 둥근 사각형 설명선 6"/>
-          <p:cNvSpPr/>
-          <p:nvPr/>
-        </p:nvSpPr>
-        <p:spPr>
-          <a:xfrm>
-            <a:off x="5535298" y="2027470"/>
-            <a:ext cx="1762125" cy="341181"/>
-          </a:xfrm>
-          <a:prstGeom prst="wedgeRoundRectCallout">
-            <a:avLst>
-              <a:gd name="adj1" fmla="val -51087"/>
-              <a:gd name="adj2" fmla="val 203676"/>
-              <a:gd name="adj3" fmla="val 16667"/>
-            </a:avLst>
-          </a:prstGeom>
-          <a:solidFill>
-            <a:schemeClr val="accent2">
-              <a:lumMod val="20000"/>
-              <a:lumOff val="80000"/>
-            </a:schemeClr>
-          </a:solidFill>
-          <a:ln w="9525">
-            <a:solidFill>
-              <a:schemeClr val="tx1"/>
-            </a:solidFill>
-            <a:prstDash val="solid"/>
-          </a:ln>
-        </p:spPr>
-        <p:style>
-          <a:lnRef idx="2">
-            <a:schemeClr val="accent1">
-              <a:shade val="50000"/>
-            </a:schemeClr>
-          </a:lnRef>
-          <a:fillRef idx="1">
-            <a:schemeClr val="accent1"/>
-          </a:fillRef>
-          <a:effectRef idx="0">
-            <a:schemeClr val="accent1"/>
-          </a:effectRef>
-          <a:fontRef idx="minor">
-            <a:schemeClr val="lt1"/>
-          </a:fontRef>
-        </p:style>
-        <p:txBody>
-          <a:bodyPr rtlCol="0" anchor="ctr"/>
-          <a:lstStyle/>
-          <a:p>
-            <a:pPr algn="ctr"/>
-            <a:r>
-              <a:rPr lang="en-US" altLang="ko-KR" sz="900" dirty="0" smtClean="0">
-                <a:solidFill>
-                  <a:schemeClr val="tx1"/>
-                </a:solidFill>
-                <a:latin typeface="Verdana" panose="020B0604030504040204" pitchFamily="34" charset="0"/>
-                <a:ea typeface="Verdana" panose="020B0604030504040204" pitchFamily="34" charset="0"/>
-              </a:rPr>
-              <a:t>1) Select Capture</a:t>
-            </a:r>
-            <a:endParaRPr lang="ko-KR" altLang="en-US" sz="900">
-              <a:solidFill>
-                <a:schemeClr val="tx1"/>
-              </a:solidFill>
-              <a:latin typeface="Verdana" panose="020B0604030504040204" pitchFamily="34" charset="0"/>
-            </a:endParaRPr>
-          </a:p>
-        </p:txBody>
-      </p:sp>
-      <p:sp>
-        <p:nvSpPr>
-          <p:cNvPr id="9" name="모서리가 둥근 사각형 설명선 8"/>
-          <p:cNvSpPr/>
-          <p:nvPr/>
-        </p:nvSpPr>
-        <p:spPr>
-          <a:xfrm>
-            <a:off x="9965419" y="3372406"/>
-            <a:ext cx="1762125" cy="529595"/>
-          </a:xfrm>
-          <a:prstGeom prst="wedgeRoundRectCallout">
-            <a:avLst>
-              <a:gd name="adj1" fmla="val -2980"/>
-              <a:gd name="adj2" fmla="val 167704"/>
-              <a:gd name="adj3" fmla="val 16667"/>
-            </a:avLst>
-          </a:prstGeom>
-          <a:solidFill>
-            <a:schemeClr val="accent2">
-              <a:lumMod val="20000"/>
-              <a:lumOff val="80000"/>
-            </a:schemeClr>
-          </a:solidFill>
-          <a:ln w="9525">
-            <a:solidFill>
-              <a:schemeClr val="tx1"/>
-            </a:solidFill>
-            <a:prstDash val="solid"/>
-          </a:ln>
-        </p:spPr>
-        <p:style>
-          <a:lnRef idx="2">
-            <a:schemeClr val="accent1">
-              <a:shade val="50000"/>
-            </a:schemeClr>
-          </a:lnRef>
-          <a:fillRef idx="1">
-            <a:schemeClr val="accent1"/>
-          </a:fillRef>
-          <a:effectRef idx="0">
-            <a:schemeClr val="accent1"/>
-          </a:effectRef>
-          <a:fontRef idx="minor">
-            <a:schemeClr val="lt1"/>
-          </a:fontRef>
-        </p:style>
-        <p:txBody>
-          <a:bodyPr rtlCol="0" anchor="ctr"/>
-          <a:lstStyle/>
-          <a:p>
-            <a:pPr algn="ctr"/>
-            <a:r>
-              <a:rPr lang="en-US" altLang="ko-KR" sz="900" dirty="0" smtClean="0">
-                <a:solidFill>
-                  <a:schemeClr val="tx1"/>
-                </a:solidFill>
-                <a:latin typeface="Verdana" panose="020B0604030504040204" pitchFamily="34" charset="0"/>
-                <a:ea typeface="Verdana" panose="020B0604030504040204" pitchFamily="34" charset="0"/>
-              </a:rPr>
-              <a:t>2) Input the name for the captured image</a:t>
-            </a:r>
-            <a:endParaRPr lang="ko-KR" altLang="en-US" sz="900">
-              <a:solidFill>
-                <a:schemeClr val="tx1"/>
-              </a:solidFill>
-              <a:latin typeface="Verdana" panose="020B0604030504040204" pitchFamily="34" charset="0"/>
-            </a:endParaRPr>
-          </a:p>
-        </p:txBody>
-      </p:sp>
-    </p:spTree>
-    <p:extLst>
-      <p:ext uri="{BB962C8B-B14F-4D97-AF65-F5344CB8AC3E}">
-        <p14:creationId xmlns:p14="http://schemas.microsoft.com/office/powerpoint/2010/main" val="1610454920"/>
-      </p:ext>
-    </p:extLst>
-  </p:cSld>
-  <p:clrMapOvr>
-    <a:masterClrMapping/>
-  </p:clrMapOvr>
-  <p:timing>
-    <p:tnLst>
-      <p:par>
-        <p:cTn id="1" dur="indefinite" restart="never" nodeType="tmRoot"/>
-      </p:par>
-    </p:tnLst>
-  </p:timing>
-</p:sld>
-</file>
-
 <file path=ppt/theme/theme1.xml><?xml version="1.0" encoding="utf-8"?>
 <a:theme xmlns:a="http://schemas.openxmlformats.org/drawingml/2006/main" name="Office 테마">
   <a:themeElements>

</xml_diff>